<commit_message>
Changes 17/07/2024: Minor changes in results and comments
</commit_message>
<xml_diff>
--- a/Single Spool Turbojet/Results/Operation/Operating Lines/Operating Lines - Detail.pptx
+++ b/Single Spool Turbojet/Results/Operation/Operating Lines/Operating Lines - Detail.pptx
@@ -113,62 +113,6 @@
     </p:ext>
   </p:extLst>
 </p:presentation>
-</file>
-
-<file path=ppt/ink/ink1.xml><?xml version="1.0" encoding="utf-8"?>
-<inkml:ink xmlns:inkml="http://www.w3.org/2003/InkML">
-  <inkml:definitions>
-    <inkml:context xml:id="ctx0">
-      <inkml:inkSource xml:id="inkSrc0">
-        <inkml:traceFormat>
-          <inkml:channel name="X" type="integer" min="-2.14748E9" max="2.14748E9" units="cm"/>
-          <inkml:channel name="Y" type="integer" min="-2.14748E9" max="2.14748E9" units="cm"/>
-          <inkml:channel name="F" type="integer" max="32767" units="dev"/>
-        </inkml:traceFormat>
-        <inkml:channelProperties>
-          <inkml:channelProperty channel="X" name="resolution" value="1000" units="1/cm"/>
-          <inkml:channelProperty channel="Y" name="resolution" value="1000" units="1/cm"/>
-          <inkml:channelProperty channel="F" name="resolution" value="0" units="1/dev"/>
-        </inkml:channelProperties>
-      </inkml:inkSource>
-      <inkml:timestamp xml:id="ts0" timeString="2024-07-15T15:34:43.274"/>
-    </inkml:context>
-    <inkml:brush xml:id="br0">
-      <inkml:brushProperty name="width" value="0.025" units="cm"/>
-      <inkml:brushProperty name="height" value="0.025" units="cm"/>
-      <inkml:brushProperty name="color" value="#F80202"/>
-    </inkml:brush>
-  </inkml:definitions>
-  <inkml:trace contextRef="#ctx0" brushRef="#br0">0 1 24575,'1'2'0,"0"-1"0,0 1 0,0 0 0,0 0 0,0-1 0,0 1 0,3 2 0,1 3 0,3 8 0,0 1 0,8 26 0,-4-19 0,-4-11 0,-3-4-1365</inkml:trace>
-</inkml:ink>
-</file>
-
-<file path=ppt/ink/ink2.xml><?xml version="1.0" encoding="utf-8"?>
-<inkml:ink xmlns:inkml="http://www.w3.org/2003/InkML">
-  <inkml:definitions>
-    <inkml:context xml:id="ctx0">
-      <inkml:inkSource xml:id="inkSrc0">
-        <inkml:traceFormat>
-          <inkml:channel name="X" type="integer" min="-2.14748E9" max="2.14748E9" units="cm"/>
-          <inkml:channel name="Y" type="integer" min="-2.14748E9" max="2.14748E9" units="cm"/>
-          <inkml:channel name="F" type="integer" max="32767" units="dev"/>
-        </inkml:traceFormat>
-        <inkml:channelProperties>
-          <inkml:channelProperty channel="X" name="resolution" value="1000" units="1/cm"/>
-          <inkml:channelProperty channel="Y" name="resolution" value="1000" units="1/cm"/>
-          <inkml:channelProperty channel="F" name="resolution" value="0" units="1/dev"/>
-        </inkml:channelProperties>
-      </inkml:inkSource>
-      <inkml:timestamp xml:id="ts0" timeString="2024-07-15T15:52:50.069"/>
-    </inkml:context>
-    <inkml:brush xml:id="br0">
-      <inkml:brushProperty name="width" value="0.025" units="cm"/>
-      <inkml:brushProperty name="height" value="0.025" units="cm"/>
-      <inkml:brushProperty name="color" value="#F80202"/>
-    </inkml:brush>
-  </inkml:definitions>
-  <inkml:trace contextRef="#ctx0" brushRef="#br0">1 0 24575,'4'6'0,"0"-1"0,0 1 0,4 7 0,-5-8 0,-1-1 0,0 0 0,1-1 0,0 1 0,-1 0 0,1-1 0,1 1 0,-1-1 0,7 5 0,-8-7-1365</inkml:trace>
-</inkml:ink>
 </file>
 
 <file path=ppt/notesMasters/notesMaster1.xml><?xml version="1.0" encoding="utf-8"?>
@@ -3734,63 +3678,12 @@
           <a:chExt cx="0" cy="0"/>
         </a:xfrm>
       </p:grpSpPr>
-      <mc:AlternateContent xmlns:mc="http://schemas.openxmlformats.org/markup-compatibility/2006">
-        <mc:Choice xmlns:p14="http://schemas.microsoft.com/office/powerpoint/2010/main" Requires="p14">
-          <p:contentPart p14:bwMode="auto" r:id="rId2">
-            <p14:nvContentPartPr>
-              <p14:cNvPr id="38" name="Entrada de lápiz 37">
-                <a:extLst>
-                  <a:ext uri="{FF2B5EF4-FFF2-40B4-BE49-F238E27FC236}">
-                    <a16:creationId xmlns:a16="http://schemas.microsoft.com/office/drawing/2014/main" id="{6AA464A1-D635-20EF-CA92-20321AB6978C}"/>
-                  </a:ext>
-                </a:extLst>
-              </p14:cNvPr>
-              <p14:cNvContentPartPr/>
-              <p14:nvPr/>
-            </p14:nvContentPartPr>
-            <p14:xfrm>
-              <a:off x="9411797" y="2076238"/>
-              <a:ext cx="26640" cy="50400"/>
-            </p14:xfrm>
-          </p:contentPart>
-        </mc:Choice>
-        <mc:Fallback>
-          <p:pic>
-            <p:nvPicPr>
-              <p:cNvPr id="38" name="Entrada de lápiz 37">
-                <a:extLst>
-                  <a:ext uri="{FF2B5EF4-FFF2-40B4-BE49-F238E27FC236}">
-                    <a16:creationId xmlns:a16="http://schemas.microsoft.com/office/drawing/2014/main" id="{6AA464A1-D635-20EF-CA92-20321AB6978C}"/>
-                  </a:ext>
-                </a:extLst>
-              </p:cNvPr>
-              <p:cNvPicPr/>
-              <p:nvPr/>
-            </p:nvPicPr>
-            <p:blipFill>
-              <a:blip r:embed="rId3"/>
-              <a:stretch>
-                <a:fillRect/>
-              </a:stretch>
-            </p:blipFill>
-            <p:spPr>
-              <a:xfrm>
-                <a:off x="9407477" y="2071918"/>
-                <a:ext cx="35280" cy="59040"/>
-              </a:xfrm>
-              <a:prstGeom prst="rect">
-                <a:avLst/>
-              </a:prstGeom>
-            </p:spPr>
-          </p:pic>
-        </mc:Fallback>
-      </mc:AlternateContent>
       <p:grpSp>
         <p:nvGrpSpPr>
-          <p:cNvPr id="62" name="Grupo 61">
-            <a:extLst>
-              <a:ext uri="{FF2B5EF4-FFF2-40B4-BE49-F238E27FC236}">
-                <a16:creationId xmlns:a16="http://schemas.microsoft.com/office/drawing/2014/main" id="{FFEDDB7D-1790-102E-6C10-9D5F945420B4}"/>
+          <p:cNvPr id="6" name="Grupo 5">
+            <a:extLst>
+              <a:ext uri="{FF2B5EF4-FFF2-40B4-BE49-F238E27FC236}">
+                <a16:creationId xmlns:a16="http://schemas.microsoft.com/office/drawing/2014/main" id="{AC1C3C31-909F-CA21-F426-62964107C4AA}"/>
               </a:ext>
             </a:extLst>
           </p:cNvPr>
@@ -3799,18 +3692,54 @@
         </p:nvGrpSpPr>
         <p:grpSpPr>
           <a:xfrm>
-            <a:off x="0" y="360232"/>
-            <a:ext cx="12192000" cy="6137535"/>
-            <a:chOff x="0" y="360232"/>
-            <a:chExt cx="12192000" cy="6137535"/>
+            <a:off x="0" y="381000"/>
+            <a:ext cx="12192000" cy="6096000"/>
+            <a:chOff x="0" y="381000"/>
+            <a:chExt cx="12192000" cy="6096000"/>
           </a:xfrm>
         </p:grpSpPr>
+        <p:pic>
+          <p:nvPicPr>
+            <p:cNvPr id="4" name="Imagen 3" descr="Gráfico&#10;&#10;Descripción generada automáticamente">
+              <a:extLst>
+                <a:ext uri="{FF2B5EF4-FFF2-40B4-BE49-F238E27FC236}">
+                  <a16:creationId xmlns:a16="http://schemas.microsoft.com/office/drawing/2014/main" id="{C3F90CC2-6D12-5A4E-624A-CBA7B2DC7F1D}"/>
+                </a:ext>
+              </a:extLst>
+            </p:cNvPr>
+            <p:cNvPicPr>
+              <a:picLocks noChangeAspect="1"/>
+            </p:cNvPicPr>
+            <p:nvPr/>
+          </p:nvPicPr>
+          <p:blipFill>
+            <a:blip r:embed="rId2">
+              <a:extLst>
+                <a:ext uri="{28A0092B-C50C-407E-A947-70E740481C1C}">
+                  <a14:useLocalDpi xmlns:a14="http://schemas.microsoft.com/office/drawing/2010/main" val="0"/>
+                </a:ext>
+              </a:extLst>
+            </a:blip>
+            <a:stretch>
+              <a:fillRect/>
+            </a:stretch>
+          </p:blipFill>
+          <p:spPr>
+            <a:xfrm>
+              <a:off x="0" y="381000"/>
+              <a:ext cx="12192000" cy="6096000"/>
+            </a:xfrm>
+            <a:prstGeom prst="rect">
+              <a:avLst/>
+            </a:prstGeom>
+          </p:spPr>
+        </p:pic>
         <p:grpSp>
           <p:nvGrpSpPr>
-            <p:cNvPr id="48" name="Grupo 47">
+            <p:cNvPr id="62" name="Grupo 61">
               <a:extLst>
                 <a:ext uri="{FF2B5EF4-FFF2-40B4-BE49-F238E27FC236}">
-                  <a16:creationId xmlns:a16="http://schemas.microsoft.com/office/drawing/2014/main" id="{9E37D071-F4B4-F342-73AE-DE3AC702F945}"/>
+                  <a16:creationId xmlns:a16="http://schemas.microsoft.com/office/drawing/2014/main" id="{FFEDDB7D-1790-102E-6C10-9D5F945420B4}"/>
                 </a:ext>
               </a:extLst>
             </p:cNvPr>
@@ -3819,18 +3748,18 @@
           </p:nvGrpSpPr>
           <p:grpSpPr>
             <a:xfrm>
-              <a:off x="0" y="360232"/>
-              <a:ext cx="12192000" cy="6137535"/>
-              <a:chOff x="0" y="360232"/>
-              <a:chExt cx="12192000" cy="6137535"/>
+              <a:off x="1529292" y="1116053"/>
+              <a:ext cx="8572869" cy="3859784"/>
+              <a:chOff x="1501302" y="1102058"/>
+              <a:chExt cx="8572869" cy="3859784"/>
             </a:xfrm>
           </p:grpSpPr>
           <p:grpSp>
             <p:nvGrpSpPr>
-              <p:cNvPr id="41" name="Grupo 40">
+              <p:cNvPr id="48" name="Grupo 47">
                 <a:extLst>
                   <a:ext uri="{FF2B5EF4-FFF2-40B4-BE49-F238E27FC236}">
-                    <a16:creationId xmlns:a16="http://schemas.microsoft.com/office/drawing/2014/main" id="{FC362DB8-7CE1-CD94-9F81-FABE3175E199}"/>
+                    <a16:creationId xmlns:a16="http://schemas.microsoft.com/office/drawing/2014/main" id="{9E37D071-F4B4-F342-73AE-DE3AC702F945}"/>
                   </a:ext>
                 </a:extLst>
               </p:cNvPr>
@@ -3839,18 +3768,18 @@
             </p:nvGrpSpPr>
             <p:grpSpPr>
               <a:xfrm>
-                <a:off x="0" y="360232"/>
-                <a:ext cx="12192000" cy="6137535"/>
-                <a:chOff x="0" y="360232"/>
-                <a:chExt cx="12192000" cy="6137535"/>
+                <a:off x="1501302" y="1102058"/>
+                <a:ext cx="7235435" cy="3859784"/>
+                <a:chOff x="1501302" y="1102058"/>
+                <a:chExt cx="7235435" cy="3859784"/>
               </a:xfrm>
             </p:grpSpPr>
             <p:grpSp>
               <p:nvGrpSpPr>
-                <p:cNvPr id="33" name="Grupo 32">
+                <p:cNvPr id="41" name="Grupo 40">
                   <a:extLst>
                     <a:ext uri="{FF2B5EF4-FFF2-40B4-BE49-F238E27FC236}">
-                      <a16:creationId xmlns:a16="http://schemas.microsoft.com/office/drawing/2014/main" id="{9C0C748B-8874-1985-22B8-2F8D9492E024}"/>
+                      <a16:creationId xmlns:a16="http://schemas.microsoft.com/office/drawing/2014/main" id="{FC362DB8-7CE1-CD94-9F81-FABE3175E199}"/>
                     </a:ext>
                   </a:extLst>
                 </p:cNvPr>
@@ -3859,18 +3788,18 @@
               </p:nvGrpSpPr>
               <p:grpSpPr>
                 <a:xfrm>
-                  <a:off x="0" y="360232"/>
-                  <a:ext cx="12192000" cy="6137535"/>
-                  <a:chOff x="0" y="360232"/>
-                  <a:chExt cx="12192000" cy="6137535"/>
+                  <a:off x="1501302" y="1102058"/>
+                  <a:ext cx="7235435" cy="3859784"/>
+                  <a:chOff x="1501302" y="1102058"/>
+                  <a:chExt cx="7235435" cy="3859784"/>
                 </a:xfrm>
               </p:grpSpPr>
               <p:grpSp>
                 <p:nvGrpSpPr>
-                  <p:cNvPr id="29" name="Grupo 28">
+                  <p:cNvPr id="33" name="Grupo 32">
                     <a:extLst>
                       <a:ext uri="{FF2B5EF4-FFF2-40B4-BE49-F238E27FC236}">
-                        <a16:creationId xmlns:a16="http://schemas.microsoft.com/office/drawing/2014/main" id="{55B6CF5B-B4F9-794C-F229-D666F05376AA}"/>
+                        <a16:creationId xmlns:a16="http://schemas.microsoft.com/office/drawing/2014/main" id="{9C0C748B-8874-1985-22B8-2F8D9492E024}"/>
                       </a:ext>
                     </a:extLst>
                   </p:cNvPr>
@@ -3879,496 +3808,933 @@
                 </p:nvGrpSpPr>
                 <p:grpSpPr>
                   <a:xfrm>
-                    <a:off x="0" y="360232"/>
-                    <a:ext cx="12192000" cy="6137535"/>
-                    <a:chOff x="0" y="360232"/>
-                    <a:chExt cx="12192000" cy="6137535"/>
+                    <a:off x="4110021" y="1378945"/>
+                    <a:ext cx="4626716" cy="3582897"/>
+                    <a:chOff x="4110021" y="1378945"/>
+                    <a:chExt cx="4626716" cy="3582897"/>
                   </a:xfrm>
                 </p:grpSpPr>
-                <p:pic>
-                  <p:nvPicPr>
-                    <p:cNvPr id="5" name="Imagen 4" descr="Gráfico&#10;&#10;Descripción generada automáticamente">
+                <p:grpSp>
+                  <p:nvGrpSpPr>
+                    <p:cNvPr id="29" name="Grupo 28">
                       <a:extLst>
                         <a:ext uri="{FF2B5EF4-FFF2-40B4-BE49-F238E27FC236}">
-                          <a16:creationId xmlns:a16="http://schemas.microsoft.com/office/drawing/2014/main" id="{3A3CE5AC-F899-3AB8-AFF8-D24993AA38E0}"/>
+                          <a16:creationId xmlns:a16="http://schemas.microsoft.com/office/drawing/2014/main" id="{55B6CF5B-B4F9-794C-F229-D666F05376AA}"/>
                         </a:ext>
                       </a:extLst>
                     </p:cNvPr>
-                    <p:cNvPicPr>
-                      <a:picLocks noChangeAspect="1"/>
-                    </p:cNvPicPr>
+                    <p:cNvGrpSpPr/>
                     <p:nvPr/>
-                  </p:nvPicPr>
-                  <p:blipFill>
-                    <a:blip r:embed="rId4">
-                      <a:extLst>
-                        <a:ext uri="{28A0092B-C50C-407E-A947-70E740481C1C}">
-                          <a14:useLocalDpi xmlns:a14="http://schemas.microsoft.com/office/drawing/2010/main" val="0"/>
-                        </a:ext>
-                      </a:extLst>
-                    </a:blip>
-                    <a:stretch>
-                      <a:fillRect/>
-                    </a:stretch>
-                  </p:blipFill>
-                  <p:spPr>
+                  </p:nvGrpSpPr>
+                  <p:grpSpPr>
                     <a:xfrm>
-                      <a:off x="0" y="360232"/>
-                      <a:ext cx="12192000" cy="6137535"/>
+                      <a:off x="4110021" y="1378945"/>
+                      <a:ext cx="4626716" cy="3205406"/>
+                      <a:chOff x="4110021" y="1378945"/>
+                      <a:chExt cx="4626716" cy="3205406"/>
                     </a:xfrm>
-                    <a:prstGeom prst="rect">
-                      <a:avLst/>
-                    </a:prstGeom>
-                  </p:spPr>
-                </p:pic>
-                <mc:AlternateContent xmlns:mc="http://schemas.openxmlformats.org/markup-compatibility/2006">
-                  <mc:Choice xmlns:a14="http://schemas.microsoft.com/office/drawing/2010/main" Requires="a14">
-                    <p:sp>
-                      <p:nvSpPr>
-                        <p:cNvPr id="18" name="CuadroTexto 17">
-                          <a:extLst>
-                            <a:ext uri="{FF2B5EF4-FFF2-40B4-BE49-F238E27FC236}">
-                              <a16:creationId xmlns:a16="http://schemas.microsoft.com/office/drawing/2014/main" id="{16B45318-AA02-37B8-2EDE-2994524661BF}"/>
-                            </a:ext>
-                          </a:extLst>
-                        </p:cNvPr>
-                        <p:cNvSpPr txBox="1"/>
-                        <p:nvPr/>
-                      </p:nvSpPr>
-                      <p:spPr>
-                        <a:xfrm>
-                          <a:off x="4110021" y="1378945"/>
-                          <a:ext cx="797975" cy="344005"/>
-                        </a:xfrm>
-                        <a:prstGeom prst="rect">
-                          <a:avLst/>
-                        </a:prstGeom>
-                        <a:noFill/>
-                        <a:effectLst>
-                          <a:glow rad="88900">
-                            <a:schemeClr val="bg1">
-                              <a:alpha val="60000"/>
-                            </a:schemeClr>
-                          </a:glow>
-                          <a:softEdge rad="0"/>
-                        </a:effectLst>
-                      </p:spPr>
-                      <p:txBody>
-                        <a:bodyPr wrap="none" lIns="0" tIns="0" rIns="0" bIns="0" rtlCol="0">
-                          <a:spAutoFit/>
-                        </a:bodyPr>
-                        <a:lstStyle/>
-                        <a:p>
-                          <a:pPr/>
-                          <a14:m>
-                            <m:oMathPara xmlns:m="http://schemas.openxmlformats.org/officeDocument/2006/math">
-                              <m:oMathParaPr>
-                                <m:jc m:val="center"/>
-                              </m:oMathParaPr>
-                              <m:oMath xmlns:m="http://schemas.openxmlformats.org/officeDocument/2006/math">
-                                <m:f>
-                                  <m:fPr>
-                                    <m:ctrlPr>
-                                      <a:rPr lang="es-ES" sz="900" b="0" i="1" smtClean="0">
-                                        <a:solidFill>
-                                          <a:schemeClr val="tx1">
-                                            <a:alpha val="85000"/>
-                                          </a:schemeClr>
-                                        </a:solidFill>
-                                        <a:effectLst/>
-                                        <a:latin typeface="Cambria Math" panose="02040503050406030204" pitchFamily="18" charset="0"/>
-                                      </a:rPr>
-                                    </m:ctrlPr>
-                                  </m:fPr>
-                                  <m:num>
-                                    <m:d>
-                                      <m:dPr>
-                                        <m:ctrlPr>
-                                          <a:rPr lang="es-ES" sz="900" b="0" i="1" smtClean="0">
-                                            <a:solidFill>
-                                              <a:schemeClr val="tx1">
-                                                <a:alpha val="85000"/>
-                                              </a:schemeClr>
-                                            </a:solidFill>
-                                            <a:effectLst/>
-                                            <a:latin typeface="Cambria Math" panose="02040503050406030204" pitchFamily="18" charset="0"/>
-                                          </a:rPr>
-                                        </m:ctrlPr>
-                                      </m:dPr>
-                                      <m:e>
-                                        <m:sSub>
-                                          <m:sSubPr>
-                                            <m:ctrlPr>
-                                              <a:rPr lang="es-ES" sz="900" b="0" i="1" smtClean="0">
-                                                <a:solidFill>
-                                                  <a:schemeClr val="tx1">
-                                                    <a:alpha val="85000"/>
-                                                  </a:schemeClr>
-                                                </a:solidFill>
-                                                <a:effectLst/>
-                                                <a:latin typeface="Cambria Math" panose="02040503050406030204" pitchFamily="18" charset="0"/>
-                                              </a:rPr>
-                                            </m:ctrlPr>
-                                          </m:sSubPr>
-                                          <m:e>
-                                            <m:r>
-                                              <a:rPr lang="es-ES" sz="900" b="0" i="1" smtClean="0">
-                                                <a:solidFill>
-                                                  <a:schemeClr val="tx1">
-                                                    <a:alpha val="85000"/>
-                                                  </a:schemeClr>
-                                                </a:solidFill>
-                                                <a:effectLst/>
-                                                <a:latin typeface="Cambria Math" panose="02040503050406030204" pitchFamily="18" charset="0"/>
-                                              </a:rPr>
-                                              <m:t>𝑁</m:t>
-                                            </m:r>
-                                          </m:e>
-                                          <m:sub>
-                                            <m:r>
-                                              <m:rPr>
-                                                <m:sty m:val="p"/>
-                                              </m:rPr>
-                                              <a:rPr lang="es-ES" sz="900" b="0" i="0" smtClean="0">
-                                                <a:solidFill>
-                                                  <a:schemeClr val="tx1">
-                                                    <a:alpha val="85000"/>
-                                                  </a:schemeClr>
-                                                </a:solidFill>
-                                                <a:effectLst/>
-                                                <a:latin typeface="Cambria Math" panose="02040503050406030204" pitchFamily="18" charset="0"/>
-                                              </a:rPr>
-                                              <m:t>C</m:t>
-                                            </m:r>
-                                          </m:sub>
-                                        </m:sSub>
-                                        <m:r>
-                                          <a:rPr lang="es-ES" sz="900" b="0" i="1" smtClean="0">
-                                            <a:solidFill>
-                                              <a:schemeClr val="tx1">
-                                                <a:alpha val="85000"/>
-                                              </a:schemeClr>
-                                            </a:solidFill>
-                                            <a:effectLst/>
-                                            <a:latin typeface="Cambria Math" panose="02040503050406030204" pitchFamily="18" charset="0"/>
-                                          </a:rPr>
-                                          <m:t>/</m:t>
-                                        </m:r>
-                                        <m:sSub>
-                                          <m:sSubPr>
-                                            <m:ctrlPr>
-                                              <a:rPr lang="es-ES" sz="900" b="0" i="1" smtClean="0">
-                                                <a:solidFill>
-                                                  <a:schemeClr val="tx1">
-                                                    <a:alpha val="85000"/>
-                                                  </a:schemeClr>
-                                                </a:solidFill>
-                                                <a:effectLst/>
-                                                <a:latin typeface="Cambria Math" panose="02040503050406030204" pitchFamily="18" charset="0"/>
-                                              </a:rPr>
-                                            </m:ctrlPr>
-                                          </m:sSubPr>
-                                          <m:e>
-                                            <m:r>
-                                              <a:rPr lang="es-ES" sz="900" b="0" i="1" smtClean="0">
-                                                <a:solidFill>
-                                                  <a:schemeClr val="tx1">
-                                                    <a:alpha val="85000"/>
-                                                  </a:schemeClr>
-                                                </a:solidFill>
-                                                <a:effectLst/>
-                                                <a:latin typeface="Cambria Math" panose="02040503050406030204" pitchFamily="18" charset="0"/>
-                                              </a:rPr>
-                                              <m:t>𝑁</m:t>
-                                            </m:r>
-                                          </m:e>
-                                          <m:sub>
-                                            <m:r>
-                                              <m:rPr>
-                                                <m:sty m:val="p"/>
-                                              </m:rPr>
-                                              <a:rPr lang="es-ES" sz="900" b="0" i="0" smtClean="0">
-                                                <a:solidFill>
-                                                  <a:schemeClr val="tx1">
-                                                    <a:alpha val="85000"/>
-                                                  </a:schemeClr>
-                                                </a:solidFill>
-                                                <a:effectLst/>
-                                                <a:latin typeface="Cambria Math" panose="02040503050406030204" pitchFamily="18" charset="0"/>
-                                              </a:rPr>
-                                              <m:t>C</m:t>
-                                            </m:r>
-                                            <m:r>
-                                              <a:rPr lang="es-ES" sz="900" b="0" i="0" smtClean="0">
-                                                <a:solidFill>
-                                                  <a:schemeClr val="tx1">
-                                                    <a:alpha val="85000"/>
-                                                  </a:schemeClr>
-                                                </a:solidFill>
-                                                <a:effectLst/>
-                                                <a:latin typeface="Cambria Math" panose="02040503050406030204" pitchFamily="18" charset="0"/>
-                                              </a:rPr>
-                                              <m:t>,</m:t>
-                                            </m:r>
-                                            <m:r>
-                                              <m:rPr>
-                                                <m:sty m:val="p"/>
-                                              </m:rPr>
-                                              <a:rPr lang="es-ES" sz="900" b="0" i="0" smtClean="0">
-                                                <a:solidFill>
-                                                  <a:schemeClr val="tx1">
-                                                    <a:alpha val="85000"/>
-                                                  </a:schemeClr>
-                                                </a:solidFill>
-                                                <a:effectLst/>
-                                                <a:latin typeface="Cambria Math" panose="02040503050406030204" pitchFamily="18" charset="0"/>
-                                              </a:rPr>
-                                              <m:t>ref</m:t>
-                                            </m:r>
-                                          </m:sub>
-                                        </m:sSub>
-                                      </m:e>
-                                    </m:d>
-                                  </m:num>
-                                  <m:den>
-                                    <m:rad>
-                                      <m:radPr>
-                                        <m:degHide m:val="on"/>
-                                        <m:ctrlPr>
-                                          <a:rPr lang="es-ES" sz="900" b="0" i="1" smtClean="0">
-                                            <a:solidFill>
-                                              <a:schemeClr val="tx1">
-                                                <a:alpha val="85000"/>
-                                              </a:schemeClr>
-                                            </a:solidFill>
-                                            <a:effectLst/>
-                                            <a:latin typeface="Cambria Math" panose="02040503050406030204" pitchFamily="18" charset="0"/>
-                                          </a:rPr>
-                                        </m:ctrlPr>
-                                      </m:radPr>
-                                      <m:deg/>
-                                      <m:e>
-                                        <m:sSub>
-                                          <m:sSubPr>
-                                            <m:ctrlPr>
-                                              <a:rPr lang="es-ES" sz="900" b="0" i="1" smtClean="0">
-                                                <a:solidFill>
-                                                  <a:schemeClr val="tx1">
-                                                    <a:alpha val="85000"/>
-                                                  </a:schemeClr>
-                                                </a:solidFill>
-                                                <a:effectLst/>
-                                                <a:latin typeface="Cambria Math" panose="02040503050406030204" pitchFamily="18" charset="0"/>
-                                              </a:rPr>
-                                            </m:ctrlPr>
-                                          </m:sSubPr>
-                                          <m:e>
-                                            <m:r>
-                                              <a:rPr lang="es-ES" sz="900" b="0" i="1" smtClean="0">
-                                                <a:solidFill>
-                                                  <a:schemeClr val="tx1">
-                                                    <a:alpha val="85000"/>
-                                                  </a:schemeClr>
-                                                </a:solidFill>
-                                                <a:effectLst/>
-                                                <a:latin typeface="Cambria Math" panose="02040503050406030204" pitchFamily="18" charset="0"/>
-                                              </a:rPr>
-                                              <m:t>𝑇</m:t>
-                                            </m:r>
-                                          </m:e>
-                                          <m:sub>
-                                            <m:r>
-                                              <a:rPr lang="es-ES" sz="900" b="0" i="1" smtClean="0">
-                                                <a:solidFill>
-                                                  <a:schemeClr val="tx1">
-                                                    <a:alpha val="85000"/>
-                                                  </a:schemeClr>
-                                                </a:solidFill>
-                                                <a:effectLst/>
-                                                <a:latin typeface="Cambria Math" panose="02040503050406030204" pitchFamily="18" charset="0"/>
-                                              </a:rPr>
-                                              <m:t>2</m:t>
-                                            </m:r>
-                                            <m:r>
-                                              <m:rPr>
-                                                <m:sty m:val="p"/>
-                                              </m:rPr>
-                                              <a:rPr lang="es-ES" sz="900" b="0" i="0" smtClean="0">
-                                                <a:solidFill>
-                                                  <a:schemeClr val="tx1">
-                                                    <a:alpha val="85000"/>
-                                                  </a:schemeClr>
-                                                </a:solidFill>
-                                                <a:effectLst/>
-                                                <a:latin typeface="Cambria Math" panose="02040503050406030204" pitchFamily="18" charset="0"/>
-                                              </a:rPr>
-                                              <m:t>t</m:t>
-                                            </m:r>
-                                          </m:sub>
-                                        </m:sSub>
-                                        <m:r>
-                                          <a:rPr lang="es-ES" sz="900" b="0" i="1" smtClean="0">
-                                            <a:solidFill>
-                                              <a:schemeClr val="tx1">
-                                                <a:alpha val="85000"/>
-                                              </a:schemeClr>
-                                            </a:solidFill>
-                                            <a:effectLst/>
-                                            <a:latin typeface="Cambria Math" panose="02040503050406030204" pitchFamily="18" charset="0"/>
-                                          </a:rPr>
-                                          <m:t>/</m:t>
-                                        </m:r>
-                                        <m:sSub>
-                                          <m:sSubPr>
-                                            <m:ctrlPr>
-                                              <a:rPr lang="es-ES" sz="900" b="0" i="1" smtClean="0">
-                                                <a:solidFill>
-                                                  <a:schemeClr val="tx1">
-                                                    <a:alpha val="85000"/>
-                                                  </a:schemeClr>
-                                                </a:solidFill>
-                                                <a:effectLst/>
-                                                <a:latin typeface="Cambria Math" panose="02040503050406030204" pitchFamily="18" charset="0"/>
-                                              </a:rPr>
-                                            </m:ctrlPr>
-                                          </m:sSubPr>
-                                          <m:e>
-                                            <m:r>
-                                              <a:rPr lang="es-ES" sz="900" b="0" i="1" smtClean="0">
-                                                <a:solidFill>
-                                                  <a:schemeClr val="tx1">
-                                                    <a:alpha val="85000"/>
-                                                  </a:schemeClr>
-                                                </a:solidFill>
-                                                <a:effectLst/>
-                                                <a:latin typeface="Cambria Math" panose="02040503050406030204" pitchFamily="18" charset="0"/>
-                                              </a:rPr>
-                                              <m:t>𝑇</m:t>
-                                            </m:r>
-                                          </m:e>
-                                          <m:sub>
-                                            <m:r>
-                                              <m:rPr>
-                                                <m:sty m:val="p"/>
-                                              </m:rPr>
-                                              <a:rPr lang="es-ES" sz="900" b="0" i="0" smtClean="0">
-                                                <a:solidFill>
-                                                  <a:schemeClr val="tx1">
-                                                    <a:alpha val="85000"/>
-                                                  </a:schemeClr>
-                                                </a:solidFill>
-                                                <a:effectLst/>
-                                                <a:latin typeface="Cambria Math" panose="02040503050406030204" pitchFamily="18" charset="0"/>
-                                              </a:rPr>
-                                              <m:t>ref</m:t>
-                                            </m:r>
-                                          </m:sub>
-                                        </m:sSub>
-                                      </m:e>
-                                    </m:rad>
-                                  </m:den>
-                                </m:f>
-                                <m:r>
-                                  <a:rPr lang="es-ES" sz="900" b="0" i="1" smtClean="0">
-                                    <a:solidFill>
-                                      <a:schemeClr val="tx1">
-                                        <a:alpha val="85000"/>
-                                      </a:schemeClr>
-                                    </a:solidFill>
-                                    <a:effectLst/>
-                                    <a:latin typeface="Cambria Math" panose="02040503050406030204" pitchFamily="18" charset="0"/>
-                                  </a:rPr>
-                                  <m:t> </m:t>
-                                </m:r>
-                                <m:r>
-                                  <a:rPr lang="es-ES" sz="900" b="0" i="0" cap="none" baseline="0" smtClean="0">
-                                    <a:solidFill>
-                                      <a:schemeClr val="tx1">
-                                        <a:alpha val="85000"/>
-                                      </a:schemeClr>
-                                    </a:solidFill>
-                                    <a:effectLst/>
-                                    <a:latin typeface="Cambria Math" panose="02040503050406030204" pitchFamily="18" charset="0"/>
-                                  </a:rPr>
-                                  <m:t>[−]</m:t>
-                                </m:r>
-                              </m:oMath>
-                            </m:oMathPara>
-                          </a14:m>
-                          <a:endParaRPr lang="es-ES" sz="900" dirty="0">
-                            <a:solidFill>
-                              <a:schemeClr val="tx1">
-                                <a:alpha val="85000"/>
+                  </p:grpSpPr>
+                  <mc:AlternateContent xmlns:mc="http://schemas.openxmlformats.org/markup-compatibility/2006" xmlns:a14="http://schemas.microsoft.com/office/drawing/2010/main">
+                    <mc:Choice Requires="a14">
+                      <p:sp>
+                        <p:nvSpPr>
+                          <p:cNvPr id="18" name="CuadroTexto 17">
+                            <a:extLst>
+                              <a:ext uri="{FF2B5EF4-FFF2-40B4-BE49-F238E27FC236}">
+                                <a16:creationId xmlns:a16="http://schemas.microsoft.com/office/drawing/2014/main" id="{16B45318-AA02-37B8-2EDE-2994524661BF}"/>
+                              </a:ext>
+                            </a:extLst>
+                          </p:cNvPr>
+                          <p:cNvSpPr txBox="1"/>
+                          <p:nvPr/>
+                        </p:nvSpPr>
+                        <p:spPr>
+                          <a:xfrm>
+                            <a:off x="4110021" y="1378945"/>
+                            <a:ext cx="797975" cy="344005"/>
+                          </a:xfrm>
+                          <a:prstGeom prst="rect">
+                            <a:avLst/>
+                          </a:prstGeom>
+                          <a:noFill/>
+                          <a:effectLst>
+                            <a:glow rad="88900">
+                              <a:schemeClr val="bg1">
+                                <a:alpha val="60000"/>
                               </a:schemeClr>
-                            </a:solidFill>
-                            <a:effectLst/>
-                            <a:latin typeface="Cambria" panose="02040503050406030204" pitchFamily="18" charset="0"/>
-                            <a:ea typeface="Cambria" panose="02040503050406030204" pitchFamily="18" charset="0"/>
-                            <a:cs typeface="Calibri Light" panose="020F0302020204030204" pitchFamily="34" charset="0"/>
-                          </a:endParaRPr>
-                        </a:p>
-                      </p:txBody>
-                    </p:sp>
-                  </mc:Choice>
-                  <mc:Fallback>
-                    <p:sp>
-                      <p:nvSpPr>
-                        <p:cNvPr id="18" name="CuadroTexto 17">
-                          <a:extLst>
-                            <a:ext uri="{FF2B5EF4-FFF2-40B4-BE49-F238E27FC236}">
-                              <a16:creationId xmlns:a16="http://schemas.microsoft.com/office/drawing/2014/main" id="{16B45318-AA02-37B8-2EDE-2994524661BF}"/>
-                            </a:ext>
-                          </a:extLst>
-                        </p:cNvPr>
-                        <p:cNvSpPr txBox="1">
-                          <a:spLocks noRot="1" noChangeAspect="1" noMove="1" noResize="1" noEditPoints="1" noAdjustHandles="1" noChangeArrowheads="1" noChangeShapeType="1" noTextEdit="1"/>
-                        </p:cNvSpPr>
-                        <p:nvPr/>
-                      </p:nvSpPr>
-                      <p:spPr>
-                        <a:xfrm>
-                          <a:off x="4110021" y="1378945"/>
-                          <a:ext cx="797975" cy="344005"/>
-                        </a:xfrm>
-                        <a:prstGeom prst="rect">
-                          <a:avLst/>
-                        </a:prstGeom>
-                        <a:blipFill>
-                          <a:blip r:embed="rId5"/>
-                          <a:stretch>
-                            <a:fillRect/>
-                          </a:stretch>
-                        </a:blipFill>
-                        <a:effectLst>
-                          <a:glow rad="88900">
-                            <a:schemeClr val="bg1">
-                              <a:alpha val="60000"/>
-                            </a:schemeClr>
-                          </a:glow>
-                          <a:softEdge rad="0"/>
-                        </a:effectLst>
-                      </p:spPr>
-                      <p:txBody>
-                        <a:bodyPr/>
-                        <a:lstStyle/>
-                        <a:p>
-                          <a:r>
-                            <a:rPr lang="es-ES">
-                              <a:noFill/>
-                            </a:rPr>
-                            <a:t> </a:t>
-                          </a:r>
-                        </a:p>
-                      </p:txBody>
-                    </p:sp>
-                  </mc:Fallback>
-                </mc:AlternateContent>
+                            </a:glow>
+                            <a:softEdge rad="0"/>
+                          </a:effectLst>
+                        </p:spPr>
+                        <p:txBody>
+                          <a:bodyPr wrap="none" lIns="0" tIns="0" rIns="0" bIns="0" rtlCol="0">
+                            <a:spAutoFit/>
+                          </a:bodyPr>
+                          <a:lstStyle/>
+                          <a:p>
+                            <a:pPr/>
+                            <a14:m>
+                              <m:oMathPara xmlns:m="http://schemas.openxmlformats.org/officeDocument/2006/math">
+                                <m:oMathParaPr>
+                                  <m:jc m:val="center"/>
+                                </m:oMathParaPr>
+                                <m:oMath xmlns:m="http://schemas.openxmlformats.org/officeDocument/2006/math">
+                                  <m:f>
+                                    <m:fPr>
+                                      <m:ctrlPr>
+                                        <a:rPr lang="es-ES" sz="900" b="0" i="1" smtClean="0">
+                                          <a:solidFill>
+                                            <a:schemeClr val="tx1">
+                                              <a:alpha val="85000"/>
+                                            </a:schemeClr>
+                                          </a:solidFill>
+                                          <a:effectLst/>
+                                          <a:latin typeface="Cambria Math" panose="02040503050406030204" pitchFamily="18" charset="0"/>
+                                        </a:rPr>
+                                      </m:ctrlPr>
+                                    </m:fPr>
+                                    <m:num>
+                                      <m:d>
+                                        <m:dPr>
+                                          <m:ctrlPr>
+                                            <a:rPr lang="es-ES" sz="900" b="0" i="1" smtClean="0">
+                                              <a:solidFill>
+                                                <a:schemeClr val="tx1">
+                                                  <a:alpha val="85000"/>
+                                                </a:schemeClr>
+                                              </a:solidFill>
+                                              <a:effectLst/>
+                                              <a:latin typeface="Cambria Math" panose="02040503050406030204" pitchFamily="18" charset="0"/>
+                                            </a:rPr>
+                                          </m:ctrlPr>
+                                        </m:dPr>
+                                        <m:e>
+                                          <m:sSub>
+                                            <m:sSubPr>
+                                              <m:ctrlPr>
+                                                <a:rPr lang="es-ES" sz="900" b="0" i="1" smtClean="0">
+                                                  <a:solidFill>
+                                                    <a:schemeClr val="tx1">
+                                                      <a:alpha val="85000"/>
+                                                    </a:schemeClr>
+                                                  </a:solidFill>
+                                                  <a:effectLst/>
+                                                  <a:latin typeface="Cambria Math" panose="02040503050406030204" pitchFamily="18" charset="0"/>
+                                                </a:rPr>
+                                              </m:ctrlPr>
+                                            </m:sSubPr>
+                                            <m:e>
+                                              <m:r>
+                                                <a:rPr lang="es-ES" sz="900" b="0" i="1" smtClean="0">
+                                                  <a:solidFill>
+                                                    <a:schemeClr val="tx1">
+                                                      <a:alpha val="85000"/>
+                                                    </a:schemeClr>
+                                                  </a:solidFill>
+                                                  <a:effectLst/>
+                                                  <a:latin typeface="Cambria Math" panose="02040503050406030204" pitchFamily="18" charset="0"/>
+                                                </a:rPr>
+                                                <m:t>𝑁</m:t>
+                                              </m:r>
+                                            </m:e>
+                                            <m:sub>
+                                              <m:r>
+                                                <m:rPr>
+                                                  <m:sty m:val="p"/>
+                                                </m:rPr>
+                                                <a:rPr lang="es-ES" sz="900" b="0" i="0" smtClean="0">
+                                                  <a:solidFill>
+                                                    <a:schemeClr val="tx1">
+                                                      <a:alpha val="85000"/>
+                                                    </a:schemeClr>
+                                                  </a:solidFill>
+                                                  <a:effectLst/>
+                                                  <a:latin typeface="Cambria Math" panose="02040503050406030204" pitchFamily="18" charset="0"/>
+                                                </a:rPr>
+                                                <m:t>C</m:t>
+                                              </m:r>
+                                            </m:sub>
+                                          </m:sSub>
+                                          <m:r>
+                                            <a:rPr lang="es-ES" sz="900" b="0" i="1" smtClean="0">
+                                              <a:solidFill>
+                                                <a:schemeClr val="tx1">
+                                                  <a:alpha val="85000"/>
+                                                </a:schemeClr>
+                                              </a:solidFill>
+                                              <a:effectLst/>
+                                              <a:latin typeface="Cambria Math" panose="02040503050406030204" pitchFamily="18" charset="0"/>
+                                            </a:rPr>
+                                            <m:t>/</m:t>
+                                          </m:r>
+                                          <m:sSub>
+                                            <m:sSubPr>
+                                              <m:ctrlPr>
+                                                <a:rPr lang="es-ES" sz="900" b="0" i="1" smtClean="0">
+                                                  <a:solidFill>
+                                                    <a:schemeClr val="tx1">
+                                                      <a:alpha val="85000"/>
+                                                    </a:schemeClr>
+                                                  </a:solidFill>
+                                                  <a:effectLst/>
+                                                  <a:latin typeface="Cambria Math" panose="02040503050406030204" pitchFamily="18" charset="0"/>
+                                                </a:rPr>
+                                              </m:ctrlPr>
+                                            </m:sSubPr>
+                                            <m:e>
+                                              <m:r>
+                                                <a:rPr lang="es-ES" sz="900" b="0" i="1" smtClean="0">
+                                                  <a:solidFill>
+                                                    <a:schemeClr val="tx1">
+                                                      <a:alpha val="85000"/>
+                                                    </a:schemeClr>
+                                                  </a:solidFill>
+                                                  <a:effectLst/>
+                                                  <a:latin typeface="Cambria Math" panose="02040503050406030204" pitchFamily="18" charset="0"/>
+                                                </a:rPr>
+                                                <m:t>𝑁</m:t>
+                                              </m:r>
+                                            </m:e>
+                                            <m:sub>
+                                              <m:r>
+                                                <m:rPr>
+                                                  <m:sty m:val="p"/>
+                                                </m:rPr>
+                                                <a:rPr lang="es-ES" sz="900" b="0" i="0" smtClean="0">
+                                                  <a:solidFill>
+                                                    <a:schemeClr val="tx1">
+                                                      <a:alpha val="85000"/>
+                                                    </a:schemeClr>
+                                                  </a:solidFill>
+                                                  <a:effectLst/>
+                                                  <a:latin typeface="Cambria Math" panose="02040503050406030204" pitchFamily="18" charset="0"/>
+                                                </a:rPr>
+                                                <m:t>C</m:t>
+                                              </m:r>
+                                              <m:r>
+                                                <a:rPr lang="es-ES" sz="900" b="0" i="0" smtClean="0">
+                                                  <a:solidFill>
+                                                    <a:schemeClr val="tx1">
+                                                      <a:alpha val="85000"/>
+                                                    </a:schemeClr>
+                                                  </a:solidFill>
+                                                  <a:effectLst/>
+                                                  <a:latin typeface="Cambria Math" panose="02040503050406030204" pitchFamily="18" charset="0"/>
+                                                </a:rPr>
+                                                <m:t>,</m:t>
+                                              </m:r>
+                                              <m:r>
+                                                <m:rPr>
+                                                  <m:sty m:val="p"/>
+                                                </m:rPr>
+                                                <a:rPr lang="es-ES" sz="900" b="0" i="0" smtClean="0">
+                                                  <a:solidFill>
+                                                    <a:schemeClr val="tx1">
+                                                      <a:alpha val="85000"/>
+                                                    </a:schemeClr>
+                                                  </a:solidFill>
+                                                  <a:effectLst/>
+                                                  <a:latin typeface="Cambria Math" panose="02040503050406030204" pitchFamily="18" charset="0"/>
+                                                </a:rPr>
+                                                <m:t>ref</m:t>
+                                              </m:r>
+                                            </m:sub>
+                                          </m:sSub>
+                                        </m:e>
+                                      </m:d>
+                                    </m:num>
+                                    <m:den>
+                                      <m:rad>
+                                        <m:radPr>
+                                          <m:degHide m:val="on"/>
+                                          <m:ctrlPr>
+                                            <a:rPr lang="es-ES" sz="900" b="0" i="1" smtClean="0">
+                                              <a:solidFill>
+                                                <a:schemeClr val="tx1">
+                                                  <a:alpha val="85000"/>
+                                                </a:schemeClr>
+                                              </a:solidFill>
+                                              <a:effectLst/>
+                                              <a:latin typeface="Cambria Math" panose="02040503050406030204" pitchFamily="18" charset="0"/>
+                                            </a:rPr>
+                                          </m:ctrlPr>
+                                        </m:radPr>
+                                        <m:deg/>
+                                        <m:e>
+                                          <m:sSub>
+                                            <m:sSubPr>
+                                              <m:ctrlPr>
+                                                <a:rPr lang="es-ES" sz="900" b="0" i="1" smtClean="0">
+                                                  <a:solidFill>
+                                                    <a:schemeClr val="tx1">
+                                                      <a:alpha val="85000"/>
+                                                    </a:schemeClr>
+                                                  </a:solidFill>
+                                                  <a:effectLst/>
+                                                  <a:latin typeface="Cambria Math" panose="02040503050406030204" pitchFamily="18" charset="0"/>
+                                                </a:rPr>
+                                              </m:ctrlPr>
+                                            </m:sSubPr>
+                                            <m:e>
+                                              <m:r>
+                                                <a:rPr lang="es-ES" sz="900" b="0" i="1" smtClean="0">
+                                                  <a:solidFill>
+                                                    <a:schemeClr val="tx1">
+                                                      <a:alpha val="85000"/>
+                                                    </a:schemeClr>
+                                                  </a:solidFill>
+                                                  <a:effectLst/>
+                                                  <a:latin typeface="Cambria Math" panose="02040503050406030204" pitchFamily="18" charset="0"/>
+                                                </a:rPr>
+                                                <m:t>𝑇</m:t>
+                                              </m:r>
+                                            </m:e>
+                                            <m:sub>
+                                              <m:r>
+                                                <a:rPr lang="es-ES" sz="900" b="0" i="1" smtClean="0">
+                                                  <a:solidFill>
+                                                    <a:schemeClr val="tx1">
+                                                      <a:alpha val="85000"/>
+                                                    </a:schemeClr>
+                                                  </a:solidFill>
+                                                  <a:effectLst/>
+                                                  <a:latin typeface="Cambria Math" panose="02040503050406030204" pitchFamily="18" charset="0"/>
+                                                </a:rPr>
+                                                <m:t>2</m:t>
+                                              </m:r>
+                                              <m:r>
+                                                <m:rPr>
+                                                  <m:sty m:val="p"/>
+                                                </m:rPr>
+                                                <a:rPr lang="es-ES" sz="900" b="0" i="0" smtClean="0">
+                                                  <a:solidFill>
+                                                    <a:schemeClr val="tx1">
+                                                      <a:alpha val="85000"/>
+                                                    </a:schemeClr>
+                                                  </a:solidFill>
+                                                  <a:effectLst/>
+                                                  <a:latin typeface="Cambria Math" panose="02040503050406030204" pitchFamily="18" charset="0"/>
+                                                </a:rPr>
+                                                <m:t>t</m:t>
+                                              </m:r>
+                                            </m:sub>
+                                          </m:sSub>
+                                          <m:r>
+                                            <a:rPr lang="es-ES" sz="900" b="0" i="1" smtClean="0">
+                                              <a:solidFill>
+                                                <a:schemeClr val="tx1">
+                                                  <a:alpha val="85000"/>
+                                                </a:schemeClr>
+                                              </a:solidFill>
+                                              <a:effectLst/>
+                                              <a:latin typeface="Cambria Math" panose="02040503050406030204" pitchFamily="18" charset="0"/>
+                                            </a:rPr>
+                                            <m:t>/</m:t>
+                                          </m:r>
+                                          <m:sSub>
+                                            <m:sSubPr>
+                                              <m:ctrlPr>
+                                                <a:rPr lang="es-ES" sz="900" b="0" i="1" smtClean="0">
+                                                  <a:solidFill>
+                                                    <a:schemeClr val="tx1">
+                                                      <a:alpha val="85000"/>
+                                                    </a:schemeClr>
+                                                  </a:solidFill>
+                                                  <a:effectLst/>
+                                                  <a:latin typeface="Cambria Math" panose="02040503050406030204" pitchFamily="18" charset="0"/>
+                                                </a:rPr>
+                                              </m:ctrlPr>
+                                            </m:sSubPr>
+                                            <m:e>
+                                              <m:r>
+                                                <a:rPr lang="es-ES" sz="900" b="0" i="1" smtClean="0">
+                                                  <a:solidFill>
+                                                    <a:schemeClr val="tx1">
+                                                      <a:alpha val="85000"/>
+                                                    </a:schemeClr>
+                                                  </a:solidFill>
+                                                  <a:effectLst/>
+                                                  <a:latin typeface="Cambria Math" panose="02040503050406030204" pitchFamily="18" charset="0"/>
+                                                </a:rPr>
+                                                <m:t>𝑇</m:t>
+                                              </m:r>
+                                            </m:e>
+                                            <m:sub>
+                                              <m:r>
+                                                <m:rPr>
+                                                  <m:sty m:val="p"/>
+                                                </m:rPr>
+                                                <a:rPr lang="es-ES" sz="900" b="0" i="0" smtClean="0">
+                                                  <a:solidFill>
+                                                    <a:schemeClr val="tx1">
+                                                      <a:alpha val="85000"/>
+                                                    </a:schemeClr>
+                                                  </a:solidFill>
+                                                  <a:effectLst/>
+                                                  <a:latin typeface="Cambria Math" panose="02040503050406030204" pitchFamily="18" charset="0"/>
+                                                </a:rPr>
+                                                <m:t>ref</m:t>
+                                              </m:r>
+                                            </m:sub>
+                                          </m:sSub>
+                                        </m:e>
+                                      </m:rad>
+                                    </m:den>
+                                  </m:f>
+                                  <m:r>
+                                    <a:rPr lang="es-ES" sz="900" b="0" i="1" smtClean="0">
+                                      <a:solidFill>
+                                        <a:schemeClr val="tx1">
+                                          <a:alpha val="85000"/>
+                                        </a:schemeClr>
+                                      </a:solidFill>
+                                      <a:effectLst/>
+                                      <a:latin typeface="Cambria Math" panose="02040503050406030204" pitchFamily="18" charset="0"/>
+                                    </a:rPr>
+                                    <m:t> </m:t>
+                                  </m:r>
+                                  <m:r>
+                                    <a:rPr lang="es-ES" sz="900" b="0" i="0" cap="none" baseline="0" smtClean="0">
+                                      <a:solidFill>
+                                        <a:schemeClr val="tx1">
+                                          <a:alpha val="85000"/>
+                                        </a:schemeClr>
+                                      </a:solidFill>
+                                      <a:effectLst/>
+                                      <a:latin typeface="Cambria Math" panose="02040503050406030204" pitchFamily="18" charset="0"/>
+                                    </a:rPr>
+                                    <m:t>[−]</m:t>
+                                  </m:r>
+                                </m:oMath>
+                              </m:oMathPara>
+                            </a14:m>
+                            <a:endParaRPr lang="es-ES" sz="900" dirty="0">
+                              <a:solidFill>
+                                <a:schemeClr val="tx1">
+                                  <a:alpha val="85000"/>
+                                </a:schemeClr>
+                              </a:solidFill>
+                              <a:effectLst/>
+                              <a:latin typeface="Cambria" panose="02040503050406030204" pitchFamily="18" charset="0"/>
+                              <a:ea typeface="Cambria" panose="02040503050406030204" pitchFamily="18" charset="0"/>
+                              <a:cs typeface="Calibri Light" panose="020F0302020204030204" pitchFamily="34" charset="0"/>
+                            </a:endParaRPr>
+                          </a:p>
+                        </p:txBody>
+                      </p:sp>
+                    </mc:Choice>
+                    <mc:Fallback xmlns="">
+                      <p:sp>
+                        <p:nvSpPr>
+                          <p:cNvPr id="18" name="CuadroTexto 17">
+                            <a:extLst>
+                              <a:ext uri="{FF2B5EF4-FFF2-40B4-BE49-F238E27FC236}">
+                                <a16:creationId xmlns:a16="http://schemas.microsoft.com/office/drawing/2014/main" id="{16B45318-AA02-37B8-2EDE-2994524661BF}"/>
+                              </a:ext>
+                            </a:extLst>
+                          </p:cNvPr>
+                          <p:cNvSpPr txBox="1">
+                            <a:spLocks noRot="1" noChangeAspect="1" noMove="1" noResize="1" noEditPoints="1" noAdjustHandles="1" noChangeArrowheads="1" noChangeShapeType="1" noTextEdit="1"/>
+                          </p:cNvSpPr>
+                          <p:nvPr/>
+                        </p:nvSpPr>
+                        <p:spPr>
+                          <a:xfrm>
+                            <a:off x="4110021" y="1378945"/>
+                            <a:ext cx="797975" cy="344005"/>
+                          </a:xfrm>
+                          <a:prstGeom prst="rect">
+                            <a:avLst/>
+                          </a:prstGeom>
+                          <a:blipFill>
+                            <a:blip r:embed="rId5"/>
+                            <a:stretch>
+                              <a:fillRect/>
+                            </a:stretch>
+                          </a:blipFill>
+                          <a:effectLst>
+                            <a:glow rad="88900">
+                              <a:schemeClr val="bg1">
+                                <a:alpha val="60000"/>
+                              </a:schemeClr>
+                            </a:glow>
+                            <a:softEdge rad="0"/>
+                          </a:effectLst>
+                        </p:spPr>
+                        <p:txBody>
+                          <a:bodyPr/>
+                          <a:lstStyle/>
+                          <a:p>
+                            <a:r>
+                              <a:rPr lang="es-ES">
+                                <a:noFill/>
+                              </a:rPr>
+                              <a:t> </a:t>
+                            </a:r>
+                          </a:p>
+                        </p:txBody>
+                      </p:sp>
+                    </mc:Fallback>
+                  </mc:AlternateContent>
+                  <p:cxnSp>
+                    <p:nvCxnSpPr>
+                      <p:cNvPr id="19" name="Conector recto 18">
+                        <a:extLst>
+                          <a:ext uri="{FF2B5EF4-FFF2-40B4-BE49-F238E27FC236}">
+                            <a16:creationId xmlns:a16="http://schemas.microsoft.com/office/drawing/2014/main" id="{99E70A48-E965-F97E-B7F3-BC9ECEEFC33B}"/>
+                          </a:ext>
+                        </a:extLst>
+                      </p:cNvPr>
+                      <p:cNvCxnSpPr>
+                        <a:cxnSpLocks/>
+                      </p:cNvCxnSpPr>
+                      <p:nvPr/>
+                    </p:nvCxnSpPr>
+                    <p:spPr>
+                      <a:xfrm>
+                        <a:off x="4511890" y="1779078"/>
+                        <a:ext cx="236814" cy="447735"/>
+                      </a:xfrm>
+                      <a:prstGeom prst="line">
+                        <a:avLst/>
+                      </a:prstGeom>
+                      <a:ln w="6350">
+                        <a:solidFill>
+                          <a:schemeClr val="tx1"/>
+                        </a:solidFill>
+                      </a:ln>
+                    </p:spPr>
+                    <p:style>
+                      <a:lnRef idx="2">
+                        <a:schemeClr val="dk1"/>
+                      </a:lnRef>
+                      <a:fillRef idx="0">
+                        <a:schemeClr val="dk1"/>
+                      </a:fillRef>
+                      <a:effectRef idx="1">
+                        <a:schemeClr val="dk1"/>
+                      </a:effectRef>
+                      <a:fontRef idx="minor">
+                        <a:schemeClr val="tx1"/>
+                      </a:fontRef>
+                    </p:style>
+                  </p:cxnSp>
+                  <mc:AlternateContent xmlns:mc="http://schemas.openxmlformats.org/markup-compatibility/2006" xmlns:a14="http://schemas.microsoft.com/office/drawing/2010/main">
+                    <mc:Choice Requires="a14">
+                      <p:sp>
+                        <p:nvSpPr>
+                          <p:cNvPr id="22" name="CuadroTexto 21">
+                            <a:extLst>
+                              <a:ext uri="{FF2B5EF4-FFF2-40B4-BE49-F238E27FC236}">
+                                <a16:creationId xmlns:a16="http://schemas.microsoft.com/office/drawing/2014/main" id="{9BF982D2-3B7E-D776-989D-3D48DB705BB7}"/>
+                              </a:ext>
+                            </a:extLst>
+                          </p:cNvPr>
+                          <p:cNvSpPr txBox="1"/>
+                          <p:nvPr/>
+                        </p:nvSpPr>
+                        <p:spPr>
+                          <a:xfrm>
+                            <a:off x="7930299" y="4262340"/>
+                            <a:ext cx="806438" cy="322011"/>
+                          </a:xfrm>
+                          <a:prstGeom prst="rect">
+                            <a:avLst/>
+                          </a:prstGeom>
+                          <a:noFill/>
+                        </p:spPr>
+                        <p:txBody>
+                          <a:bodyPr wrap="none" lIns="0" tIns="0" rIns="0" bIns="0" rtlCol="0">
+                            <a:spAutoFit/>
+                          </a:bodyPr>
+                          <a:lstStyle/>
+                          <a:p>
+                            <a:pPr/>
+                            <a14:m>
+                              <m:oMathPara xmlns:m="http://schemas.openxmlformats.org/officeDocument/2006/math">
+                                <m:oMathParaPr>
+                                  <m:jc m:val="centerGroup"/>
+                                </m:oMathParaPr>
+                                <m:oMath xmlns:m="http://schemas.openxmlformats.org/officeDocument/2006/math">
+                                  <m:f>
+                                    <m:fPr>
+                                      <m:ctrlPr>
+                                        <a:rPr lang="es-ES" sz="900" b="0" i="1" smtClean="0">
+                                          <a:solidFill>
+                                            <a:schemeClr val="tx1">
+                                              <a:alpha val="85000"/>
+                                            </a:schemeClr>
+                                          </a:solidFill>
+                                          <a:latin typeface="Cambria Math" panose="02040503050406030204" pitchFamily="18" charset="0"/>
+                                        </a:rPr>
+                                      </m:ctrlPr>
+                                    </m:fPr>
+                                    <m:num>
+                                      <m:sSub>
+                                        <m:sSubPr>
+                                          <m:ctrlPr>
+                                            <a:rPr lang="es-ES" sz="900" b="0" i="1" smtClean="0">
+                                              <a:solidFill>
+                                                <a:schemeClr val="tx1">
+                                                  <a:alpha val="85000"/>
+                                                </a:schemeClr>
+                                              </a:solidFill>
+                                              <a:latin typeface="Cambria Math" panose="02040503050406030204" pitchFamily="18" charset="0"/>
+                                            </a:rPr>
+                                          </m:ctrlPr>
+                                        </m:sSubPr>
+                                        <m:e>
+                                          <m:r>
+                                            <a:rPr lang="es-ES" sz="900" b="0" i="1" smtClean="0">
+                                              <a:solidFill>
+                                                <a:schemeClr val="tx1">
+                                                  <a:alpha val="85000"/>
+                                                </a:schemeClr>
+                                              </a:solidFill>
+                                              <a:latin typeface="Cambria Math" panose="02040503050406030204" pitchFamily="18" charset="0"/>
+                                            </a:rPr>
+                                            <m:t>(</m:t>
+                                          </m:r>
+                                          <m:r>
+                                            <a:rPr lang="es-ES" sz="900" b="0" i="1" smtClean="0">
+                                              <a:solidFill>
+                                                <a:schemeClr val="tx1">
+                                                  <a:alpha val="85000"/>
+                                                </a:schemeClr>
+                                              </a:solidFill>
+                                              <a:latin typeface="Cambria Math" panose="02040503050406030204" pitchFamily="18" charset="0"/>
+                                            </a:rPr>
+                                            <m:t>𝑁</m:t>
+                                          </m:r>
+                                        </m:e>
+                                        <m:sub>
+                                          <m:r>
+                                            <m:rPr>
+                                              <m:sty m:val="p"/>
+                                            </m:rPr>
+                                            <a:rPr lang="es-ES" sz="900" b="0" i="0" smtClean="0">
+                                              <a:solidFill>
+                                                <a:schemeClr val="tx1">
+                                                  <a:alpha val="85000"/>
+                                                </a:schemeClr>
+                                              </a:solidFill>
+                                              <a:latin typeface="Cambria Math" panose="02040503050406030204" pitchFamily="18" charset="0"/>
+                                            </a:rPr>
+                                            <m:t>T</m:t>
+                                          </m:r>
+                                        </m:sub>
+                                      </m:sSub>
+                                      <m:r>
+                                        <a:rPr lang="es-ES" sz="900" b="0" i="1" smtClean="0">
+                                          <a:solidFill>
+                                            <a:schemeClr val="tx1">
+                                              <a:alpha val="85000"/>
+                                            </a:schemeClr>
+                                          </a:solidFill>
+                                          <a:latin typeface="Cambria Math" panose="02040503050406030204" pitchFamily="18" charset="0"/>
+                                        </a:rPr>
+                                        <m:t>/</m:t>
+                                      </m:r>
+                                      <m:sSub>
+                                        <m:sSubPr>
+                                          <m:ctrlPr>
+                                            <a:rPr lang="es-ES" sz="900" b="0" i="1" smtClean="0">
+                                              <a:solidFill>
+                                                <a:schemeClr val="tx1">
+                                                  <a:alpha val="85000"/>
+                                                </a:schemeClr>
+                                              </a:solidFill>
+                                              <a:latin typeface="Cambria Math" panose="02040503050406030204" pitchFamily="18" charset="0"/>
+                                            </a:rPr>
+                                          </m:ctrlPr>
+                                        </m:sSubPr>
+                                        <m:e>
+                                          <m:r>
+                                            <a:rPr lang="es-ES" sz="900" b="0" i="1" smtClean="0">
+                                              <a:solidFill>
+                                                <a:schemeClr val="tx1">
+                                                  <a:alpha val="85000"/>
+                                                </a:schemeClr>
+                                              </a:solidFill>
+                                              <a:latin typeface="Cambria Math" panose="02040503050406030204" pitchFamily="18" charset="0"/>
+                                            </a:rPr>
+                                            <m:t>𝑁</m:t>
+                                          </m:r>
+                                        </m:e>
+                                        <m:sub>
+                                          <m:r>
+                                            <m:rPr>
+                                              <m:sty m:val="p"/>
+                                            </m:rPr>
+                                            <a:rPr lang="es-ES" sz="900" b="0" i="0" smtClean="0">
+                                              <a:solidFill>
+                                                <a:schemeClr val="tx1">
+                                                  <a:alpha val="85000"/>
+                                                </a:schemeClr>
+                                              </a:solidFill>
+                                              <a:latin typeface="Cambria Math" panose="02040503050406030204" pitchFamily="18" charset="0"/>
+                                            </a:rPr>
+                                            <m:t>T</m:t>
+                                          </m:r>
+                                          <m:r>
+                                            <a:rPr lang="es-ES" sz="900" b="0" i="0" smtClean="0">
+                                              <a:solidFill>
+                                                <a:schemeClr val="tx1">
+                                                  <a:alpha val="85000"/>
+                                                </a:schemeClr>
+                                              </a:solidFill>
+                                              <a:latin typeface="Cambria Math" panose="02040503050406030204" pitchFamily="18" charset="0"/>
+                                            </a:rPr>
+                                            <m:t>,</m:t>
+                                          </m:r>
+                                          <m:r>
+                                            <m:rPr>
+                                              <m:sty m:val="p"/>
+                                            </m:rPr>
+                                            <a:rPr lang="es-ES" sz="900" b="0" i="0" smtClean="0">
+                                              <a:solidFill>
+                                                <a:schemeClr val="tx1">
+                                                  <a:alpha val="85000"/>
+                                                </a:schemeClr>
+                                              </a:solidFill>
+                                              <a:latin typeface="Cambria Math" panose="02040503050406030204" pitchFamily="18" charset="0"/>
+                                            </a:rPr>
+                                            <m:t>ref</m:t>
+                                          </m:r>
+                                        </m:sub>
+                                      </m:sSub>
+                                      <m:r>
+                                        <a:rPr lang="es-ES" sz="900" b="0" i="1" smtClean="0">
+                                          <a:solidFill>
+                                            <a:schemeClr val="tx1">
+                                              <a:alpha val="85000"/>
+                                            </a:schemeClr>
+                                          </a:solidFill>
+                                          <a:latin typeface="Cambria Math" panose="02040503050406030204" pitchFamily="18" charset="0"/>
+                                        </a:rPr>
+                                        <m:t>)</m:t>
+                                      </m:r>
+                                    </m:num>
+                                    <m:den>
+                                      <m:rad>
+                                        <m:radPr>
+                                          <m:degHide m:val="on"/>
+                                          <m:ctrlPr>
+                                            <a:rPr lang="es-ES" sz="900" b="0" i="1" smtClean="0">
+                                              <a:solidFill>
+                                                <a:schemeClr val="tx1">
+                                                  <a:alpha val="85000"/>
+                                                </a:schemeClr>
+                                              </a:solidFill>
+                                              <a:latin typeface="Cambria Math" panose="02040503050406030204" pitchFamily="18" charset="0"/>
+                                            </a:rPr>
+                                          </m:ctrlPr>
+                                        </m:radPr>
+                                        <m:deg/>
+                                        <m:e>
+                                          <m:sSub>
+                                            <m:sSubPr>
+                                              <m:ctrlPr>
+                                                <a:rPr lang="es-ES" sz="900" b="0" i="1" smtClean="0">
+                                                  <a:solidFill>
+                                                    <a:schemeClr val="tx1">
+                                                      <a:alpha val="85000"/>
+                                                    </a:schemeClr>
+                                                  </a:solidFill>
+                                                  <a:latin typeface="Cambria Math" panose="02040503050406030204" pitchFamily="18" charset="0"/>
+                                                </a:rPr>
+                                              </m:ctrlPr>
+                                            </m:sSubPr>
+                                            <m:e>
+                                              <m:r>
+                                                <a:rPr lang="es-ES" sz="900" b="0" i="1" smtClean="0">
+                                                  <a:solidFill>
+                                                    <a:schemeClr val="tx1">
+                                                      <a:alpha val="85000"/>
+                                                    </a:schemeClr>
+                                                  </a:solidFill>
+                                                  <a:latin typeface="Cambria Math" panose="02040503050406030204" pitchFamily="18" charset="0"/>
+                                                </a:rPr>
+                                                <m:t>𝑇</m:t>
+                                              </m:r>
+                                            </m:e>
+                                            <m:sub>
+                                              <m:r>
+                                                <a:rPr lang="es-ES" sz="900" b="0" i="1" smtClean="0">
+                                                  <a:solidFill>
+                                                    <a:schemeClr val="tx1">
+                                                      <a:alpha val="85000"/>
+                                                    </a:schemeClr>
+                                                  </a:solidFill>
+                                                  <a:latin typeface="Cambria Math" panose="02040503050406030204" pitchFamily="18" charset="0"/>
+                                                </a:rPr>
+                                                <m:t>4</m:t>
+                                              </m:r>
+                                              <m:r>
+                                                <a:rPr lang="es-ES" sz="900" b="0" i="0" smtClean="0">
+                                                  <a:solidFill>
+                                                    <a:schemeClr val="tx1">
+                                                      <a:alpha val="85000"/>
+                                                    </a:schemeClr>
+                                                  </a:solidFill>
+                                                  <a:latin typeface="Cambria Math" panose="02040503050406030204" pitchFamily="18" charset="0"/>
+                                                </a:rPr>
+                                                <m:t>1</m:t>
+                                              </m:r>
+                                              <m:r>
+                                                <m:rPr>
+                                                  <m:sty m:val="p"/>
+                                                </m:rPr>
+                                                <a:rPr lang="es-ES" sz="900" b="0" i="0" smtClean="0">
+                                                  <a:solidFill>
+                                                    <a:schemeClr val="tx1">
+                                                      <a:alpha val="85000"/>
+                                                    </a:schemeClr>
+                                                  </a:solidFill>
+                                                  <a:latin typeface="Cambria Math" panose="02040503050406030204" pitchFamily="18" charset="0"/>
+                                                </a:rPr>
+                                                <m:t>t</m:t>
+                                              </m:r>
+                                            </m:sub>
+                                          </m:sSub>
+                                          <m:r>
+                                            <a:rPr lang="es-ES" sz="900" b="0" i="1" smtClean="0">
+                                              <a:solidFill>
+                                                <a:schemeClr val="tx1">
+                                                  <a:alpha val="85000"/>
+                                                </a:schemeClr>
+                                              </a:solidFill>
+                                              <a:latin typeface="Cambria Math" panose="02040503050406030204" pitchFamily="18" charset="0"/>
+                                            </a:rPr>
+                                            <m:t>/</m:t>
+                                          </m:r>
+                                          <m:sSub>
+                                            <m:sSubPr>
+                                              <m:ctrlPr>
+                                                <a:rPr lang="es-ES" sz="900" b="0" i="1" smtClean="0">
+                                                  <a:solidFill>
+                                                    <a:schemeClr val="tx1">
+                                                      <a:alpha val="85000"/>
+                                                    </a:schemeClr>
+                                                  </a:solidFill>
+                                                  <a:latin typeface="Cambria Math" panose="02040503050406030204" pitchFamily="18" charset="0"/>
+                                                </a:rPr>
+                                              </m:ctrlPr>
+                                            </m:sSubPr>
+                                            <m:e>
+                                              <m:r>
+                                                <a:rPr lang="es-ES" sz="900" b="0" i="1" smtClean="0">
+                                                  <a:solidFill>
+                                                    <a:schemeClr val="tx1">
+                                                      <a:alpha val="85000"/>
+                                                    </a:schemeClr>
+                                                  </a:solidFill>
+                                                  <a:latin typeface="Cambria Math" panose="02040503050406030204" pitchFamily="18" charset="0"/>
+                                                </a:rPr>
+                                                <m:t>𝑇</m:t>
+                                              </m:r>
+                                            </m:e>
+                                            <m:sub>
+                                              <m:r>
+                                                <m:rPr>
+                                                  <m:sty m:val="p"/>
+                                                </m:rPr>
+                                                <a:rPr lang="es-ES" sz="900" b="0" i="0" smtClean="0">
+                                                  <a:solidFill>
+                                                    <a:schemeClr val="tx1">
+                                                      <a:alpha val="85000"/>
+                                                    </a:schemeClr>
+                                                  </a:solidFill>
+                                                  <a:latin typeface="Cambria Math" panose="02040503050406030204" pitchFamily="18" charset="0"/>
+                                                </a:rPr>
+                                                <m:t>ref</m:t>
+                                              </m:r>
+                                            </m:sub>
+                                          </m:sSub>
+                                        </m:e>
+                                      </m:rad>
+                                    </m:den>
+                                  </m:f>
+                                  <m:r>
+                                    <a:rPr lang="es-ES" sz="900" b="0" i="1" smtClean="0">
+                                      <a:solidFill>
+                                        <a:schemeClr val="tx1">
+                                          <a:alpha val="85000"/>
+                                        </a:schemeClr>
+                                      </a:solidFill>
+                                      <a:latin typeface="Cambria Math" panose="02040503050406030204" pitchFamily="18" charset="0"/>
+                                    </a:rPr>
+                                    <m:t> [−]</m:t>
+                                  </m:r>
+                                </m:oMath>
+                              </m:oMathPara>
+                            </a14:m>
+                            <a:endParaRPr lang="es-ES" sz="900" dirty="0">
+                              <a:solidFill>
+                                <a:schemeClr val="tx1">
+                                  <a:alpha val="85000"/>
+                                </a:schemeClr>
+                              </a:solidFill>
+                              <a:latin typeface="CMU Bright" panose="02000603000000000000" pitchFamily="2" charset="0"/>
+                              <a:ea typeface="CMU Bright" panose="02000603000000000000" pitchFamily="2" charset="0"/>
+                              <a:cs typeface="CMU Bright" panose="02000603000000000000" pitchFamily="2" charset="0"/>
+                            </a:endParaRPr>
+                          </a:p>
+                        </p:txBody>
+                      </p:sp>
+                    </mc:Choice>
+                    <mc:Fallback xmlns="">
+                      <p:sp>
+                        <p:nvSpPr>
+                          <p:cNvPr id="22" name="CuadroTexto 21">
+                            <a:extLst>
+                              <a:ext uri="{FF2B5EF4-FFF2-40B4-BE49-F238E27FC236}">
+                                <a16:creationId xmlns:a16="http://schemas.microsoft.com/office/drawing/2014/main" id="{9BF982D2-3B7E-D776-989D-3D48DB705BB7}"/>
+                              </a:ext>
+                            </a:extLst>
+                          </p:cNvPr>
+                          <p:cNvSpPr txBox="1">
+                            <a:spLocks noRot="1" noChangeAspect="1" noMove="1" noResize="1" noEditPoints="1" noAdjustHandles="1" noChangeArrowheads="1" noChangeShapeType="1" noTextEdit="1"/>
+                          </p:cNvSpPr>
+                          <p:nvPr/>
+                        </p:nvSpPr>
+                        <p:spPr>
+                          <a:xfrm>
+                            <a:off x="7930299" y="4262340"/>
+                            <a:ext cx="806438" cy="322011"/>
+                          </a:xfrm>
+                          <a:prstGeom prst="rect">
+                            <a:avLst/>
+                          </a:prstGeom>
+                          <a:blipFill>
+                            <a:blip r:embed="rId6"/>
+                            <a:stretch>
+                              <a:fillRect l="-3788" t="-3774" r="-4545" b="-11321"/>
+                            </a:stretch>
+                          </a:blipFill>
+                        </p:spPr>
+                        <p:txBody>
+                          <a:bodyPr/>
+                          <a:lstStyle/>
+                          <a:p>
+                            <a:r>
+                              <a:rPr lang="es-ES">
+                                <a:noFill/>
+                              </a:rPr>
+                              <a:t> </a:t>
+                            </a:r>
+                          </a:p>
+                        </p:txBody>
+                      </p:sp>
+                    </mc:Fallback>
+                  </mc:AlternateContent>
+                </p:grpSp>
                 <p:cxnSp>
                   <p:nvCxnSpPr>
-                    <p:cNvPr id="19" name="Conector recto 18">
+                    <p:cNvPr id="30" name="Conector recto 29">
                       <a:extLst>
                         <a:ext uri="{FF2B5EF4-FFF2-40B4-BE49-F238E27FC236}">
-                          <a16:creationId xmlns:a16="http://schemas.microsoft.com/office/drawing/2014/main" id="{99E70A48-E965-F97E-B7F3-BC9ECEEFC33B}"/>
+                          <a16:creationId xmlns:a16="http://schemas.microsoft.com/office/drawing/2014/main" id="{7FD5DF37-F436-7184-62E6-415905FC3060}"/>
                         </a:ext>
                       </a:extLst>
                     </p:cNvPr>
@@ -4379,8 +4745,8 @@
                   </p:nvCxnSpPr>
                   <p:spPr>
                     <a:xfrm>
-                      <a:off x="4511890" y="1779078"/>
-                      <a:ext cx="236814" cy="447735"/>
+                      <a:off x="8415528" y="4620768"/>
+                      <a:ext cx="292317" cy="341074"/>
                     </a:xfrm>
                     <a:prstGeom prst="line">
                       <a:avLst/>
@@ -4406,510 +4772,465 @@
                     </a:fontRef>
                   </p:style>
                 </p:cxnSp>
-                <mc:AlternateContent xmlns:mc="http://schemas.openxmlformats.org/markup-compatibility/2006">
-                  <mc:Choice xmlns:a14="http://schemas.microsoft.com/office/drawing/2010/main" Requires="a14">
-                    <p:sp>
-                      <p:nvSpPr>
-                        <p:cNvPr id="22" name="CuadroTexto 21">
-                          <a:extLst>
-                            <a:ext uri="{FF2B5EF4-FFF2-40B4-BE49-F238E27FC236}">
-                              <a16:creationId xmlns:a16="http://schemas.microsoft.com/office/drawing/2014/main" id="{9BF982D2-3B7E-D776-989D-3D48DB705BB7}"/>
-                            </a:ext>
-                          </a:extLst>
-                        </p:cNvPr>
-                        <p:cNvSpPr txBox="1"/>
-                        <p:nvPr/>
-                      </p:nvSpPr>
-                      <p:spPr>
-                        <a:xfrm>
-                          <a:off x="7930299" y="4262340"/>
-                          <a:ext cx="806438" cy="322011"/>
-                        </a:xfrm>
-                        <a:prstGeom prst="rect">
-                          <a:avLst/>
-                        </a:prstGeom>
-                        <a:noFill/>
-                      </p:spPr>
-                      <p:txBody>
-                        <a:bodyPr wrap="none" lIns="0" tIns="0" rIns="0" bIns="0" rtlCol="0">
-                          <a:spAutoFit/>
-                        </a:bodyPr>
-                        <a:lstStyle/>
-                        <a:p>
-                          <a:pPr/>
-                          <a14:m>
-                            <m:oMathPara xmlns:m="http://schemas.openxmlformats.org/officeDocument/2006/math">
-                              <m:oMathParaPr>
-                                <m:jc m:val="centerGroup"/>
-                              </m:oMathParaPr>
-                              <m:oMath xmlns:m="http://schemas.openxmlformats.org/officeDocument/2006/math">
-                                <m:f>
-                                  <m:fPr>
-                                    <m:ctrlPr>
-                                      <a:rPr lang="es-ES" sz="900" b="0" i="1" smtClean="0">
-                                        <a:solidFill>
-                                          <a:schemeClr val="tx1">
-                                            <a:alpha val="85000"/>
-                                          </a:schemeClr>
-                                        </a:solidFill>
-                                        <a:latin typeface="Cambria Math" panose="02040503050406030204" pitchFamily="18" charset="0"/>
-                                      </a:rPr>
-                                    </m:ctrlPr>
-                                  </m:fPr>
-                                  <m:num>
-                                    <m:sSub>
-                                      <m:sSubPr>
-                                        <m:ctrlPr>
-                                          <a:rPr lang="es-ES" sz="900" b="0" i="1" smtClean="0">
-                                            <a:solidFill>
-                                              <a:schemeClr val="tx1">
-                                                <a:alpha val="85000"/>
-                                              </a:schemeClr>
-                                            </a:solidFill>
-                                            <a:latin typeface="Cambria Math" panose="02040503050406030204" pitchFamily="18" charset="0"/>
-                                          </a:rPr>
-                                        </m:ctrlPr>
-                                      </m:sSubPr>
-                                      <m:e>
-                                        <m:r>
-                                          <a:rPr lang="es-ES" sz="900" b="0" i="1" smtClean="0">
-                                            <a:solidFill>
-                                              <a:schemeClr val="tx1">
-                                                <a:alpha val="85000"/>
-                                              </a:schemeClr>
-                                            </a:solidFill>
-                                            <a:latin typeface="Cambria Math" panose="02040503050406030204" pitchFamily="18" charset="0"/>
-                                          </a:rPr>
-                                          <m:t>(</m:t>
-                                        </m:r>
-                                        <m:r>
-                                          <a:rPr lang="es-ES" sz="900" b="0" i="1" smtClean="0">
-                                            <a:solidFill>
-                                              <a:schemeClr val="tx1">
-                                                <a:alpha val="85000"/>
-                                              </a:schemeClr>
-                                            </a:solidFill>
-                                            <a:latin typeface="Cambria Math" panose="02040503050406030204" pitchFamily="18" charset="0"/>
-                                          </a:rPr>
-                                          <m:t>𝑁</m:t>
-                                        </m:r>
-                                      </m:e>
-                                      <m:sub>
-                                        <m:r>
-                                          <m:rPr>
-                                            <m:sty m:val="p"/>
-                                          </m:rPr>
-                                          <a:rPr lang="es-ES" sz="900" b="0" i="0" smtClean="0">
-                                            <a:solidFill>
-                                              <a:schemeClr val="tx1">
-                                                <a:alpha val="85000"/>
-                                              </a:schemeClr>
-                                            </a:solidFill>
-                                            <a:latin typeface="Cambria Math" panose="02040503050406030204" pitchFamily="18" charset="0"/>
-                                          </a:rPr>
-                                          <m:t>T</m:t>
-                                        </m:r>
-                                      </m:sub>
-                                    </m:sSub>
-                                    <m:r>
-                                      <a:rPr lang="es-ES" sz="900" b="0" i="1" smtClean="0">
-                                        <a:solidFill>
-                                          <a:schemeClr val="tx1">
-                                            <a:alpha val="85000"/>
-                                          </a:schemeClr>
-                                        </a:solidFill>
-                                        <a:latin typeface="Cambria Math" panose="02040503050406030204" pitchFamily="18" charset="0"/>
-                                      </a:rPr>
-                                      <m:t>/</m:t>
-                                    </m:r>
-                                    <m:sSub>
-                                      <m:sSubPr>
-                                        <m:ctrlPr>
-                                          <a:rPr lang="es-ES" sz="900" b="0" i="1" smtClean="0">
-                                            <a:solidFill>
-                                              <a:schemeClr val="tx1">
-                                                <a:alpha val="85000"/>
-                                              </a:schemeClr>
-                                            </a:solidFill>
-                                            <a:latin typeface="Cambria Math" panose="02040503050406030204" pitchFamily="18" charset="0"/>
-                                          </a:rPr>
-                                        </m:ctrlPr>
-                                      </m:sSubPr>
-                                      <m:e>
-                                        <m:r>
-                                          <a:rPr lang="es-ES" sz="900" b="0" i="1" smtClean="0">
-                                            <a:solidFill>
-                                              <a:schemeClr val="tx1">
-                                                <a:alpha val="85000"/>
-                                              </a:schemeClr>
-                                            </a:solidFill>
-                                            <a:latin typeface="Cambria Math" panose="02040503050406030204" pitchFamily="18" charset="0"/>
-                                          </a:rPr>
-                                          <m:t>𝑁</m:t>
-                                        </m:r>
-                                      </m:e>
-                                      <m:sub>
-                                        <m:r>
-                                          <m:rPr>
-                                            <m:sty m:val="p"/>
-                                          </m:rPr>
-                                          <a:rPr lang="es-ES" sz="900" b="0" i="0" smtClean="0">
-                                            <a:solidFill>
-                                              <a:schemeClr val="tx1">
-                                                <a:alpha val="85000"/>
-                                              </a:schemeClr>
-                                            </a:solidFill>
-                                            <a:latin typeface="Cambria Math" panose="02040503050406030204" pitchFamily="18" charset="0"/>
-                                          </a:rPr>
-                                          <m:t>T</m:t>
-                                        </m:r>
-                                        <m:r>
-                                          <a:rPr lang="es-ES" sz="900" b="0" i="0" smtClean="0">
-                                            <a:solidFill>
-                                              <a:schemeClr val="tx1">
-                                                <a:alpha val="85000"/>
-                                              </a:schemeClr>
-                                            </a:solidFill>
-                                            <a:latin typeface="Cambria Math" panose="02040503050406030204" pitchFamily="18" charset="0"/>
-                                          </a:rPr>
-                                          <m:t>,</m:t>
-                                        </m:r>
-                                        <m:r>
-                                          <m:rPr>
-                                            <m:sty m:val="p"/>
-                                          </m:rPr>
-                                          <a:rPr lang="es-ES" sz="900" b="0" i="0" smtClean="0">
-                                            <a:solidFill>
-                                              <a:schemeClr val="tx1">
-                                                <a:alpha val="85000"/>
-                                              </a:schemeClr>
-                                            </a:solidFill>
-                                            <a:latin typeface="Cambria Math" panose="02040503050406030204" pitchFamily="18" charset="0"/>
-                                          </a:rPr>
-                                          <m:t>ref</m:t>
-                                        </m:r>
-                                      </m:sub>
-                                    </m:sSub>
-                                    <m:r>
-                                      <a:rPr lang="es-ES" sz="900" b="0" i="1" smtClean="0">
-                                        <a:solidFill>
-                                          <a:schemeClr val="tx1">
-                                            <a:alpha val="85000"/>
-                                          </a:schemeClr>
-                                        </a:solidFill>
-                                        <a:latin typeface="Cambria Math" panose="02040503050406030204" pitchFamily="18" charset="0"/>
-                                      </a:rPr>
-                                      <m:t>)</m:t>
-                                    </m:r>
-                                  </m:num>
-                                  <m:den>
-                                    <m:rad>
-                                      <m:radPr>
-                                        <m:degHide m:val="on"/>
-                                        <m:ctrlPr>
-                                          <a:rPr lang="es-ES" sz="900" b="0" i="1" smtClean="0">
-                                            <a:solidFill>
-                                              <a:schemeClr val="tx1">
-                                                <a:alpha val="85000"/>
-                                              </a:schemeClr>
-                                            </a:solidFill>
-                                            <a:latin typeface="Cambria Math" panose="02040503050406030204" pitchFamily="18" charset="0"/>
-                                          </a:rPr>
-                                        </m:ctrlPr>
-                                      </m:radPr>
-                                      <m:deg/>
-                                      <m:e>
-                                        <m:sSub>
-                                          <m:sSubPr>
-                                            <m:ctrlPr>
-                                              <a:rPr lang="es-ES" sz="900" b="0" i="1" smtClean="0">
-                                                <a:solidFill>
-                                                  <a:schemeClr val="tx1">
-                                                    <a:alpha val="85000"/>
-                                                  </a:schemeClr>
-                                                </a:solidFill>
-                                                <a:latin typeface="Cambria Math" panose="02040503050406030204" pitchFamily="18" charset="0"/>
-                                              </a:rPr>
-                                            </m:ctrlPr>
-                                          </m:sSubPr>
-                                          <m:e>
-                                            <m:r>
-                                              <a:rPr lang="es-ES" sz="900" b="0" i="1" smtClean="0">
-                                                <a:solidFill>
-                                                  <a:schemeClr val="tx1">
-                                                    <a:alpha val="85000"/>
-                                                  </a:schemeClr>
-                                                </a:solidFill>
-                                                <a:latin typeface="Cambria Math" panose="02040503050406030204" pitchFamily="18" charset="0"/>
-                                              </a:rPr>
-                                              <m:t>𝑇</m:t>
-                                            </m:r>
-                                          </m:e>
-                                          <m:sub>
-                                            <m:r>
-                                              <a:rPr lang="es-ES" sz="900" b="0" i="1" smtClean="0">
-                                                <a:solidFill>
-                                                  <a:schemeClr val="tx1">
-                                                    <a:alpha val="85000"/>
-                                                  </a:schemeClr>
-                                                </a:solidFill>
-                                                <a:latin typeface="Cambria Math" panose="02040503050406030204" pitchFamily="18" charset="0"/>
-                                              </a:rPr>
-                                              <m:t>4</m:t>
-                                            </m:r>
-                                            <m:r>
-                                              <a:rPr lang="es-ES" sz="900" b="0" i="0" smtClean="0">
-                                                <a:solidFill>
-                                                  <a:schemeClr val="tx1">
-                                                    <a:alpha val="85000"/>
-                                                  </a:schemeClr>
-                                                </a:solidFill>
-                                                <a:latin typeface="Cambria Math" panose="02040503050406030204" pitchFamily="18" charset="0"/>
-                                              </a:rPr>
-                                              <m:t>1</m:t>
-                                            </m:r>
-                                            <m:r>
-                                              <m:rPr>
-                                                <m:sty m:val="p"/>
-                                              </m:rPr>
-                                              <a:rPr lang="es-ES" sz="900" b="0" i="0" smtClean="0">
-                                                <a:solidFill>
-                                                  <a:schemeClr val="tx1">
-                                                    <a:alpha val="85000"/>
-                                                  </a:schemeClr>
-                                                </a:solidFill>
-                                                <a:latin typeface="Cambria Math" panose="02040503050406030204" pitchFamily="18" charset="0"/>
-                                              </a:rPr>
-                                              <m:t>t</m:t>
-                                            </m:r>
-                                          </m:sub>
-                                        </m:sSub>
-                                        <m:r>
-                                          <a:rPr lang="es-ES" sz="900" b="0" i="1" smtClean="0">
-                                            <a:solidFill>
-                                              <a:schemeClr val="tx1">
-                                                <a:alpha val="85000"/>
-                                              </a:schemeClr>
-                                            </a:solidFill>
-                                            <a:latin typeface="Cambria Math" panose="02040503050406030204" pitchFamily="18" charset="0"/>
-                                          </a:rPr>
-                                          <m:t>/</m:t>
-                                        </m:r>
-                                        <m:sSub>
-                                          <m:sSubPr>
-                                            <m:ctrlPr>
-                                              <a:rPr lang="es-ES" sz="900" b="0" i="1" smtClean="0">
-                                                <a:solidFill>
-                                                  <a:schemeClr val="tx1">
-                                                    <a:alpha val="85000"/>
-                                                  </a:schemeClr>
-                                                </a:solidFill>
-                                                <a:latin typeface="Cambria Math" panose="02040503050406030204" pitchFamily="18" charset="0"/>
-                                              </a:rPr>
-                                            </m:ctrlPr>
-                                          </m:sSubPr>
-                                          <m:e>
-                                            <m:r>
-                                              <a:rPr lang="es-ES" sz="900" b="0" i="1" smtClean="0">
-                                                <a:solidFill>
-                                                  <a:schemeClr val="tx1">
-                                                    <a:alpha val="85000"/>
-                                                  </a:schemeClr>
-                                                </a:solidFill>
-                                                <a:latin typeface="Cambria Math" panose="02040503050406030204" pitchFamily="18" charset="0"/>
-                                              </a:rPr>
-                                              <m:t>𝑇</m:t>
-                                            </m:r>
-                                          </m:e>
-                                          <m:sub>
-                                            <m:r>
-                                              <m:rPr>
-                                                <m:sty m:val="p"/>
-                                              </m:rPr>
-                                              <a:rPr lang="es-ES" sz="900" b="0" i="0" smtClean="0">
-                                                <a:solidFill>
-                                                  <a:schemeClr val="tx1">
-                                                    <a:alpha val="85000"/>
-                                                  </a:schemeClr>
-                                                </a:solidFill>
-                                                <a:latin typeface="Cambria Math" panose="02040503050406030204" pitchFamily="18" charset="0"/>
-                                              </a:rPr>
-                                              <m:t>ref</m:t>
-                                            </m:r>
-                                          </m:sub>
-                                        </m:sSub>
-                                      </m:e>
-                                    </m:rad>
-                                  </m:den>
-                                </m:f>
-                                <m:r>
-                                  <a:rPr lang="es-ES" sz="900" b="0" i="1" smtClean="0">
-                                    <a:solidFill>
-                                      <a:schemeClr val="tx1">
-                                        <a:alpha val="85000"/>
-                                      </a:schemeClr>
-                                    </a:solidFill>
-                                    <a:latin typeface="Cambria Math" panose="02040503050406030204" pitchFamily="18" charset="0"/>
-                                  </a:rPr>
-                                  <m:t> [−]</m:t>
-                                </m:r>
-                              </m:oMath>
-                            </m:oMathPara>
-                          </a14:m>
-                          <a:endParaRPr lang="es-ES" sz="900" dirty="0">
-                            <a:solidFill>
-                              <a:schemeClr val="tx1">
-                                <a:alpha val="85000"/>
-                              </a:schemeClr>
-                            </a:solidFill>
-                            <a:latin typeface="CMU Bright" panose="02000603000000000000" pitchFamily="2" charset="0"/>
-                            <a:ea typeface="CMU Bright" panose="02000603000000000000" pitchFamily="2" charset="0"/>
-                            <a:cs typeface="CMU Bright" panose="02000603000000000000" pitchFamily="2" charset="0"/>
-                          </a:endParaRPr>
-                        </a:p>
-                      </p:txBody>
-                    </p:sp>
-                  </mc:Choice>
-                  <mc:Fallback>
-                    <p:sp>
-                      <p:nvSpPr>
-                        <p:cNvPr id="22" name="CuadroTexto 21">
-                          <a:extLst>
-                            <a:ext uri="{FF2B5EF4-FFF2-40B4-BE49-F238E27FC236}">
-                              <a16:creationId xmlns:a16="http://schemas.microsoft.com/office/drawing/2014/main" id="{9BF982D2-3B7E-D776-989D-3D48DB705BB7}"/>
-                            </a:ext>
-                          </a:extLst>
-                        </p:cNvPr>
-                        <p:cNvSpPr txBox="1">
-                          <a:spLocks noRot="1" noChangeAspect="1" noMove="1" noResize="1" noEditPoints="1" noAdjustHandles="1" noChangeArrowheads="1" noChangeShapeType="1" noTextEdit="1"/>
-                        </p:cNvSpPr>
-                        <p:nvPr/>
-                      </p:nvSpPr>
-                      <p:spPr>
-                        <a:xfrm>
-                          <a:off x="7930299" y="4262340"/>
-                          <a:ext cx="806438" cy="322011"/>
-                        </a:xfrm>
-                        <a:prstGeom prst="rect">
-                          <a:avLst/>
-                        </a:prstGeom>
-                        <a:blipFill>
-                          <a:blip r:embed="rId6"/>
-                          <a:stretch>
-                            <a:fillRect l="-3788" t="-3774" r="-4545" b="-11321"/>
-                          </a:stretch>
-                        </a:blipFill>
-                      </p:spPr>
-                      <p:txBody>
-                        <a:bodyPr/>
-                        <a:lstStyle/>
-                        <a:p>
-                          <a:r>
-                            <a:rPr lang="es-ES">
-                              <a:noFill/>
-                            </a:rPr>
-                            <a:t> </a:t>
-                          </a:r>
-                        </a:p>
-                      </p:txBody>
-                    </p:sp>
-                  </mc:Fallback>
-                </mc:AlternateContent>
               </p:grpSp>
-              <p:cxnSp>
-                <p:nvCxnSpPr>
-                  <p:cNvPr id="30" name="Conector recto 29">
+              <p:pic>
+                <p:nvPicPr>
+                  <p:cNvPr id="40" name="Imagen 39" descr="Gráfico, Gráfico de superficie&#10;&#10;Descripción generada automáticamente">
                     <a:extLst>
                       <a:ext uri="{FF2B5EF4-FFF2-40B4-BE49-F238E27FC236}">
-                        <a16:creationId xmlns:a16="http://schemas.microsoft.com/office/drawing/2014/main" id="{7FD5DF37-F436-7184-62E6-415905FC3060}"/>
+                        <a16:creationId xmlns:a16="http://schemas.microsoft.com/office/drawing/2014/main" id="{3542B075-C8BC-0F2F-F316-DFAB4604FD43}"/>
                       </a:ext>
                     </a:extLst>
                   </p:cNvPr>
-                  <p:cNvCxnSpPr>
-                    <a:cxnSpLocks/>
-                  </p:cNvCxnSpPr>
+                  <p:cNvPicPr>
+                    <a:picLocks noChangeAspect="1"/>
+                  </p:cNvPicPr>
                   <p:nvPr/>
-                </p:nvCxnSpPr>
+                </p:nvPicPr>
+                <p:blipFill>
+                  <a:blip r:embed="rId7">
+                    <a:extLst>
+                      <a:ext uri="{28A0092B-C50C-407E-A947-70E740481C1C}">
+                        <a14:useLocalDpi xmlns:a14="http://schemas.microsoft.com/office/drawing/2010/main" val="0"/>
+                      </a:ext>
+                    </a:extLst>
+                  </a:blip>
+                  <a:stretch>
+                    <a:fillRect/>
+                  </a:stretch>
+                </p:blipFill>
                 <p:spPr>
                   <a:xfrm>
-                    <a:off x="8415528" y="4620768"/>
-                    <a:ext cx="292317" cy="341074"/>
+                    <a:off x="1501302" y="1102058"/>
+                    <a:ext cx="2024948" cy="1999680"/>
                   </a:xfrm>
-                  <a:prstGeom prst="line">
+                  <a:prstGeom prst="rect">
                     <a:avLst/>
                   </a:prstGeom>
-                  <a:ln w="6350">
+                  <a:ln>
                     <a:solidFill>
                       <a:schemeClr val="tx1"/>
                     </a:solidFill>
                   </a:ln>
                 </p:spPr>
-                <p:style>
-                  <a:lnRef idx="2">
-                    <a:schemeClr val="dk1"/>
-                  </a:lnRef>
-                  <a:fillRef idx="0">
-                    <a:schemeClr val="dk1"/>
-                  </a:fillRef>
-                  <a:effectRef idx="1">
-                    <a:schemeClr val="dk1"/>
-                  </a:effectRef>
-                  <a:fontRef idx="minor">
-                    <a:schemeClr val="tx1"/>
-                  </a:fontRef>
-                </p:style>
-              </p:cxnSp>
+              </p:pic>
             </p:grpSp>
-            <p:pic>
-              <p:nvPicPr>
-                <p:cNvPr id="40" name="Imagen 39" descr="Gráfico, Gráfico de superficie&#10;&#10;Descripción generada automáticamente">
+            <mc:AlternateContent xmlns:mc="http://schemas.openxmlformats.org/markup-compatibility/2006" xmlns:a14="http://schemas.microsoft.com/office/drawing/2010/main">
+              <mc:Choice Requires="a14">
+                <p:sp>
+                  <p:nvSpPr>
+                    <p:cNvPr id="42" name="CuadroTexto 41">
+                      <a:extLst>
+                        <a:ext uri="{FF2B5EF4-FFF2-40B4-BE49-F238E27FC236}">
+                          <a16:creationId xmlns:a16="http://schemas.microsoft.com/office/drawing/2014/main" id="{677512E5-14DB-C4FA-99D5-3AFE9FEAAC4E}"/>
+                        </a:ext>
+                      </a:extLst>
+                    </p:cNvPr>
+                    <p:cNvSpPr txBox="1"/>
+                    <p:nvPr/>
+                  </p:nvSpPr>
+                  <p:spPr>
+                    <a:xfrm>
+                      <a:off x="1528782" y="1150720"/>
+                      <a:ext cx="593150" cy="261610"/>
+                    </a:xfrm>
+                    <a:prstGeom prst="rect">
+                      <a:avLst/>
+                    </a:prstGeom>
+                    <a:noFill/>
+                    <a:ln w="9525">
+                      <a:solidFill>
+                        <a:schemeClr val="tx1"/>
+                      </a:solidFill>
+                    </a:ln>
+                  </p:spPr>
+                  <p:txBody>
+                    <a:bodyPr wrap="square" rtlCol="0">
+                      <a:spAutoFit/>
+                    </a:bodyPr>
+                    <a:lstStyle/>
+                    <a:p>
+                      <a:r>
+                        <a:rPr lang="es-ES" sz="1100" i="1" dirty="0">
+                          <a:solidFill>
+                            <a:srgbClr val="FF0000"/>
+                          </a:solidFill>
+                          <a:latin typeface="CMU Serif" panose="02000603000000000000" pitchFamily="2" charset="0"/>
+                          <a:ea typeface="CMU Serif" panose="02000603000000000000" pitchFamily="2" charset="0"/>
+                          <a:cs typeface="CMU Serif" panose="02000603000000000000" pitchFamily="2" charset="0"/>
+                        </a:rPr>
+                        <a:t>M</a:t>
+                      </a:r>
+                      <a:r>
+                        <a:rPr lang="es-ES" sz="1100" baseline="-25000" dirty="0">
+                          <a:solidFill>
+                            <a:srgbClr val="FF0000"/>
+                          </a:solidFill>
+                          <a:latin typeface="CMU Serif" panose="02000603000000000000" pitchFamily="2" charset="0"/>
+                          <a:ea typeface="CMU Serif" panose="02000603000000000000" pitchFamily="2" charset="0"/>
+                          <a:cs typeface="CMU Serif" panose="02000603000000000000" pitchFamily="2" charset="0"/>
+                        </a:rPr>
+                        <a:t>0 </a:t>
+                      </a:r>
+                      <a14:m>
+                        <m:oMath xmlns:m="http://schemas.openxmlformats.org/officeDocument/2006/math">
+                          <m:r>
+                            <a:rPr lang="es-ES" sz="1100" b="0" i="0" dirty="0" smtClean="0">
+                              <a:solidFill>
+                                <a:srgbClr val="FF0000"/>
+                              </a:solidFill>
+                              <a:latin typeface="Cambria Math" panose="02040503050406030204" pitchFamily="18" charset="0"/>
+                              <a:ea typeface="Adobe Ming Std L" panose="02020300000000000000" pitchFamily="18" charset="-128"/>
+                              <a:cs typeface="CMU Serif" panose="02000603000000000000" pitchFamily="2" charset="0"/>
+                            </a:rPr>
+                            <m:t>[</m:t>
+                          </m:r>
+                          <m:r>
+                            <a:rPr lang="es-ES" sz="1100" i="1" dirty="0" smtClean="0">
+                              <a:solidFill>
+                                <a:srgbClr val="FF0000"/>
+                              </a:solidFill>
+                              <a:latin typeface="Cambria Math" panose="02040503050406030204" pitchFamily="18" charset="0"/>
+                              <a:ea typeface="Adobe Ming Std L" panose="02020300000000000000" pitchFamily="18" charset="-128"/>
+                              <a:cs typeface="CMU Serif" panose="02000603000000000000" pitchFamily="2" charset="0"/>
+                            </a:rPr>
+                            <m:t>−</m:t>
+                          </m:r>
+                          <m:r>
+                            <a:rPr lang="es-ES" sz="1100" b="0" i="0" dirty="0" smtClean="0">
+                              <a:solidFill>
+                                <a:srgbClr val="FF0000"/>
+                              </a:solidFill>
+                              <a:latin typeface="Cambria Math" panose="02040503050406030204" pitchFamily="18" charset="0"/>
+                              <a:ea typeface="Adobe Ming Std L" panose="02020300000000000000" pitchFamily="18" charset="-128"/>
+                              <a:cs typeface="CMU Serif" panose="02000603000000000000" pitchFamily="2" charset="0"/>
+                            </a:rPr>
+                            <m:t>]</m:t>
+                          </m:r>
+                        </m:oMath>
+                      </a14:m>
+                      <a:endParaRPr lang="es-ES" sz="1100" dirty="0">
+                        <a:solidFill>
+                          <a:srgbClr val="FF0000"/>
+                        </a:solidFill>
+                        <a:latin typeface="CMU Serif" panose="02000603000000000000" pitchFamily="2" charset="0"/>
+                        <a:ea typeface="CMU Serif" panose="02000603000000000000" pitchFamily="2" charset="0"/>
+                        <a:cs typeface="CMU Serif" panose="02000603000000000000" pitchFamily="2" charset="0"/>
+                      </a:endParaRPr>
+                    </a:p>
+                  </p:txBody>
+                </p:sp>
+              </mc:Choice>
+              <mc:Fallback xmlns="">
+                <p:sp>
+                  <p:nvSpPr>
+                    <p:cNvPr id="42" name="CuadroTexto 41">
+                      <a:extLst>
+                        <a:ext uri="{FF2B5EF4-FFF2-40B4-BE49-F238E27FC236}">
+                          <a16:creationId xmlns:a16="http://schemas.microsoft.com/office/drawing/2014/main" id="{677512E5-14DB-C4FA-99D5-3AFE9FEAAC4E}"/>
+                        </a:ext>
+                      </a:extLst>
+                    </p:cNvPr>
+                    <p:cNvSpPr txBox="1">
+                      <a:spLocks noRot="1" noChangeAspect="1" noMove="1" noResize="1" noEditPoints="1" noAdjustHandles="1" noChangeArrowheads="1" noChangeShapeType="1" noTextEdit="1"/>
+                    </p:cNvSpPr>
+                    <p:nvPr/>
+                  </p:nvSpPr>
+                  <p:spPr>
+                    <a:xfrm>
+                      <a:off x="1528782" y="1150720"/>
+                      <a:ext cx="593150" cy="261610"/>
+                    </a:xfrm>
+                    <a:prstGeom prst="rect">
+                      <a:avLst/>
+                    </a:prstGeom>
+                    <a:blipFill>
+                      <a:blip r:embed="rId8"/>
+                      <a:stretch>
+                        <a:fillRect b="-13333"/>
+                      </a:stretch>
+                    </a:blipFill>
+                    <a:ln w="9525">
+                      <a:solidFill>
+                        <a:schemeClr val="tx1"/>
+                      </a:solidFill>
+                    </a:ln>
+                  </p:spPr>
+                  <p:txBody>
+                    <a:bodyPr/>
+                    <a:lstStyle/>
+                    <a:p>
+                      <a:r>
+                        <a:rPr lang="es-ES">
+                          <a:noFill/>
+                        </a:rPr>
+                        <a:t> </a:t>
+                      </a:r>
+                    </a:p>
+                  </p:txBody>
+                </p:sp>
+              </mc:Fallback>
+            </mc:AlternateContent>
+            <p:sp>
+              <p:nvSpPr>
+                <p:cNvPr id="43" name="CuadroTexto 42">
                   <a:extLst>
                     <a:ext uri="{FF2B5EF4-FFF2-40B4-BE49-F238E27FC236}">
-                      <a16:creationId xmlns:a16="http://schemas.microsoft.com/office/drawing/2014/main" id="{3542B075-C8BC-0F2F-F316-DFAB4604FD43}"/>
+                      <a16:creationId xmlns:a16="http://schemas.microsoft.com/office/drawing/2014/main" id="{3DD0C622-74AB-9EC4-C8E7-75F0278CD253}"/>
                     </a:ext>
                   </a:extLst>
                 </p:cNvPr>
-                <p:cNvPicPr>
-                  <a:picLocks noChangeAspect="1"/>
-                </p:cNvPicPr>
+                <p:cNvSpPr txBox="1"/>
                 <p:nvPr/>
-              </p:nvPicPr>
-              <p:blipFill>
-                <a:blip r:embed="rId7">
-                  <a:extLst>
-                    <a:ext uri="{28A0092B-C50C-407E-A947-70E740481C1C}">
-                      <a14:useLocalDpi xmlns:a14="http://schemas.microsoft.com/office/drawing/2010/main" val="0"/>
-                    </a:ext>
-                  </a:extLst>
-                </a:blip>
-                <a:stretch>
-                  <a:fillRect/>
-                </a:stretch>
-              </p:blipFill>
+              </p:nvSpPr>
               <p:spPr>
                 <a:xfrm>
-                  <a:off x="1465729" y="1102058"/>
-                  <a:ext cx="2060521" cy="2020860"/>
+                  <a:off x="1688682" y="2401703"/>
+                  <a:ext cx="535517" cy="230832"/>
                 </a:xfrm>
                 <a:prstGeom prst="rect">
                   <a:avLst/>
                 </a:prstGeom>
-                <a:ln>
-                  <a:solidFill>
-                    <a:schemeClr val="tx1"/>
-                  </a:solidFill>
-                </a:ln>
+                <a:noFill/>
               </p:spPr>
-            </p:pic>
+              <p:txBody>
+                <a:bodyPr wrap="square" rtlCol="0">
+                  <a:spAutoFit/>
+                </a:bodyPr>
+                <a:lstStyle/>
+                <a:p>
+                  <a:r>
+                    <a:rPr lang="es-ES" sz="900" b="1" dirty="0">
+                      <a:solidFill>
+                        <a:srgbClr val="FF0000"/>
+                      </a:solidFill>
+                      <a:latin typeface="CMU Sans Serif" panose="02000603000000000000" pitchFamily="2" charset="0"/>
+                      <a:ea typeface="CMU Sans Serif" panose="02000603000000000000" pitchFamily="2" charset="0"/>
+                      <a:cs typeface="CMU Sans Serif" panose="02000603000000000000" pitchFamily="2" charset="0"/>
+                    </a:rPr>
+                    <a:t>0.0</a:t>
+                  </a:r>
+                </a:p>
+              </p:txBody>
+            </p:sp>
+            <p:sp>
+              <p:nvSpPr>
+                <p:cNvPr id="44" name="CuadroTexto 43">
+                  <a:extLst>
+                    <a:ext uri="{FF2B5EF4-FFF2-40B4-BE49-F238E27FC236}">
+                      <a16:creationId xmlns:a16="http://schemas.microsoft.com/office/drawing/2014/main" id="{909CF04C-992D-896A-66A5-96793F1F6860}"/>
+                    </a:ext>
+                  </a:extLst>
+                </p:cNvPr>
+                <p:cNvSpPr txBox="1"/>
+                <p:nvPr/>
+              </p:nvSpPr>
+              <p:spPr>
+                <a:xfrm>
+                  <a:off x="1730316" y="2516805"/>
+                  <a:ext cx="535517" cy="230832"/>
+                </a:xfrm>
+                <a:prstGeom prst="rect">
+                  <a:avLst/>
+                </a:prstGeom>
+                <a:noFill/>
+              </p:spPr>
+              <p:txBody>
+                <a:bodyPr wrap="square" rtlCol="0">
+                  <a:spAutoFit/>
+                </a:bodyPr>
+                <a:lstStyle/>
+                <a:p>
+                  <a:r>
+                    <a:rPr lang="es-ES" sz="900" b="1" dirty="0">
+                      <a:solidFill>
+                        <a:srgbClr val="FF0000"/>
+                      </a:solidFill>
+                      <a:latin typeface="CMU Sans Serif" panose="02000603000000000000" pitchFamily="2" charset="0"/>
+                      <a:ea typeface="CMU Sans Serif" panose="02000603000000000000" pitchFamily="2" charset="0"/>
+                      <a:cs typeface="CMU Sans Serif" panose="02000603000000000000" pitchFamily="2" charset="0"/>
+                    </a:rPr>
+                    <a:t>0.25</a:t>
+                  </a:r>
+                </a:p>
+              </p:txBody>
+            </p:sp>
+            <p:sp>
+              <p:nvSpPr>
+                <p:cNvPr id="45" name="CuadroTexto 44">
+                  <a:extLst>
+                    <a:ext uri="{FF2B5EF4-FFF2-40B4-BE49-F238E27FC236}">
+                      <a16:creationId xmlns:a16="http://schemas.microsoft.com/office/drawing/2014/main" id="{3227B984-D2F3-127D-9366-2E094BDE2742}"/>
+                    </a:ext>
+                  </a:extLst>
+                </p:cNvPr>
+                <p:cNvSpPr txBox="1"/>
+                <p:nvPr/>
+              </p:nvSpPr>
+              <p:spPr>
+                <a:xfrm>
+                  <a:off x="1980567" y="2505655"/>
+                  <a:ext cx="535517" cy="230832"/>
+                </a:xfrm>
+                <a:prstGeom prst="rect">
+                  <a:avLst/>
+                </a:prstGeom>
+                <a:noFill/>
+              </p:spPr>
+              <p:txBody>
+                <a:bodyPr wrap="square" rtlCol="0">
+                  <a:spAutoFit/>
+                </a:bodyPr>
+                <a:lstStyle/>
+                <a:p>
+                  <a:r>
+                    <a:rPr lang="es-ES" sz="900" b="1" dirty="0">
+                      <a:solidFill>
+                        <a:srgbClr val="FF0000"/>
+                      </a:solidFill>
+                      <a:latin typeface="CMU Sans Serif" panose="02000603000000000000" pitchFamily="2" charset="0"/>
+                      <a:ea typeface="CMU Sans Serif" panose="02000603000000000000" pitchFamily="2" charset="0"/>
+                      <a:cs typeface="CMU Sans Serif" panose="02000603000000000000" pitchFamily="2" charset="0"/>
+                    </a:rPr>
+                    <a:t>0.5</a:t>
+                  </a:r>
+                </a:p>
+              </p:txBody>
+            </p:sp>
+            <p:sp>
+              <p:nvSpPr>
+                <p:cNvPr id="46" name="CuadroTexto 45">
+                  <a:extLst>
+                    <a:ext uri="{FF2B5EF4-FFF2-40B4-BE49-F238E27FC236}">
+                      <a16:creationId xmlns:a16="http://schemas.microsoft.com/office/drawing/2014/main" id="{6A1BE949-F8B2-2DB6-2C4A-08FB986C8A12}"/>
+                    </a:ext>
+                  </a:extLst>
+                </p:cNvPr>
+                <p:cNvSpPr txBox="1"/>
+                <p:nvPr/>
+              </p:nvSpPr>
+              <p:spPr>
+                <a:xfrm>
+                  <a:off x="2157108" y="2555825"/>
+                  <a:ext cx="535517" cy="230832"/>
+                </a:xfrm>
+                <a:prstGeom prst="rect">
+                  <a:avLst/>
+                </a:prstGeom>
+                <a:noFill/>
+              </p:spPr>
+              <p:txBody>
+                <a:bodyPr wrap="square" rtlCol="0">
+                  <a:spAutoFit/>
+                </a:bodyPr>
+                <a:lstStyle/>
+                <a:p>
+                  <a:r>
+                    <a:rPr lang="es-ES" sz="900" b="1" dirty="0">
+                      <a:solidFill>
+                        <a:srgbClr val="FF0000"/>
+                      </a:solidFill>
+                      <a:latin typeface="CMU Sans Serif" panose="02000603000000000000" pitchFamily="2" charset="0"/>
+                      <a:ea typeface="CMU Sans Serif" panose="02000603000000000000" pitchFamily="2" charset="0"/>
+                      <a:cs typeface="CMU Sans Serif" panose="02000603000000000000" pitchFamily="2" charset="0"/>
+                    </a:rPr>
+                    <a:t>0.75</a:t>
+                  </a:r>
+                </a:p>
+              </p:txBody>
+            </p:sp>
+            <p:sp>
+              <p:nvSpPr>
+                <p:cNvPr id="47" name="CuadroTexto 46">
+                  <a:extLst>
+                    <a:ext uri="{FF2B5EF4-FFF2-40B4-BE49-F238E27FC236}">
+                      <a16:creationId xmlns:a16="http://schemas.microsoft.com/office/drawing/2014/main" id="{FBC0964B-87A5-52DF-525D-310B49FD68E0}"/>
+                    </a:ext>
+                  </a:extLst>
+                </p:cNvPr>
+                <p:cNvSpPr txBox="1"/>
+                <p:nvPr/>
+              </p:nvSpPr>
+              <p:spPr>
+                <a:xfrm>
+                  <a:off x="2307467" y="2440723"/>
+                  <a:ext cx="535517" cy="230832"/>
+                </a:xfrm>
+                <a:prstGeom prst="rect">
+                  <a:avLst/>
+                </a:prstGeom>
+                <a:noFill/>
+              </p:spPr>
+              <p:txBody>
+                <a:bodyPr wrap="square" rtlCol="0">
+                  <a:spAutoFit/>
+                </a:bodyPr>
+                <a:lstStyle/>
+                <a:p>
+                  <a:r>
+                    <a:rPr lang="es-ES" sz="900" b="1" dirty="0">
+                      <a:solidFill>
+                        <a:srgbClr val="FF0000"/>
+                      </a:solidFill>
+                      <a:latin typeface="CMU Sans Serif" panose="02000603000000000000" pitchFamily="2" charset="0"/>
+                      <a:ea typeface="CMU Sans Serif" panose="02000603000000000000" pitchFamily="2" charset="0"/>
+                      <a:cs typeface="CMU Sans Serif" panose="02000603000000000000" pitchFamily="2" charset="0"/>
+                    </a:rPr>
+                    <a:t>1.0</a:t>
+                  </a:r>
+                </a:p>
+              </p:txBody>
+            </p:sp>
           </p:grpSp>
-          <mc:AlternateContent xmlns:mc="http://schemas.openxmlformats.org/markup-compatibility/2006">
-            <mc:Choice xmlns:a14="http://schemas.microsoft.com/office/drawing/2010/main" Requires="a14">
+          <p:pic>
+            <p:nvPicPr>
+              <p:cNvPr id="50" name="Imagen 49" descr="Imagen que contiene Gráfico&#10;&#10;Descripción generada automáticamente">
+                <a:extLst>
+                  <a:ext uri="{FF2B5EF4-FFF2-40B4-BE49-F238E27FC236}">
+                    <a16:creationId xmlns:a16="http://schemas.microsoft.com/office/drawing/2014/main" id="{BE57A326-C509-20FA-1A25-67CA1D1CC8AB}"/>
+                  </a:ext>
+                </a:extLst>
+              </p:cNvPr>
+              <p:cNvPicPr>
+                <a:picLocks noChangeAspect="1"/>
+              </p:cNvPicPr>
+              <p:nvPr/>
+            </p:nvPicPr>
+            <p:blipFill>
+              <a:blip r:embed="rId9">
+                <a:extLst>
+                  <a:ext uri="{28A0092B-C50C-407E-A947-70E740481C1C}">
+                    <a14:useLocalDpi xmlns:a14="http://schemas.microsoft.com/office/drawing/2010/main" val="0"/>
+                  </a:ext>
+                </a:extLst>
+              </a:blip>
+              <a:stretch>
+                <a:fillRect/>
+              </a:stretch>
+            </p:blipFill>
+            <p:spPr>
+              <a:xfrm>
+                <a:off x="7638600" y="1102059"/>
+                <a:ext cx="2200772" cy="2805907"/>
+              </a:xfrm>
+              <a:prstGeom prst="rect">
+                <a:avLst/>
+              </a:prstGeom>
+              <a:ln>
+                <a:solidFill>
+                  <a:schemeClr val="tx1"/>
+                </a:solidFill>
+              </a:ln>
+            </p:spPr>
+          </p:pic>
+          <mc:AlternateContent xmlns:mc="http://schemas.openxmlformats.org/markup-compatibility/2006" xmlns:a14="http://schemas.microsoft.com/office/drawing/2010/main">
+            <mc:Choice Requires="a14">
               <p:sp>
                 <p:nvSpPr>
-                  <p:cNvPr id="42" name="CuadroTexto 41">
+                  <p:cNvPr id="51" name="CuadroTexto 50">
                     <a:extLst>
                       <a:ext uri="{FF2B5EF4-FFF2-40B4-BE49-F238E27FC236}">
-                        <a16:creationId xmlns:a16="http://schemas.microsoft.com/office/drawing/2014/main" id="{677512E5-14DB-C4FA-99D5-3AFE9FEAAC4E}"/>
+                        <a16:creationId xmlns:a16="http://schemas.microsoft.com/office/drawing/2014/main" id="{68C6E714-B071-63B7-787A-CDAE2FCCF87F}"/>
                       </a:ext>
                     </a:extLst>
                   </p:cNvPr>
@@ -4918,13 +5239,15 @@
                 </p:nvSpPr>
                 <p:spPr>
                   <a:xfrm>
-                    <a:off x="1528782" y="1150720"/>
-                    <a:ext cx="593150" cy="261610"/>
+                    <a:off x="9045661" y="1159427"/>
+                    <a:ext cx="663765" cy="261610"/>
                   </a:xfrm>
                   <a:prstGeom prst="rect">
                     <a:avLst/>
                   </a:prstGeom>
-                  <a:noFill/>
+                  <a:solidFill>
+                    <a:schemeClr val="bg1"/>
+                  </a:solidFill>
                   <a:ln w="9525">
                     <a:solidFill>
                       <a:schemeClr val="tx1"/>
@@ -4957,7 +5280,7 @@
                         <a:ea typeface="CMU Serif" panose="02000603000000000000" pitchFamily="2" charset="0"/>
                         <a:cs typeface="CMU Serif" panose="02000603000000000000" pitchFamily="2" charset="0"/>
                       </a:rPr>
-                      <a:t>0 </a:t>
+                      <a:t>0</a:t>
                     </a:r>
                     <a14:m>
                       <m:oMath xmlns:m="http://schemas.openxmlformats.org/officeDocument/2006/math">
@@ -4970,7 +5293,7 @@
                             <a:ea typeface="Adobe Ming Std L" panose="02020300000000000000" pitchFamily="18" charset="-128"/>
                             <a:cs typeface="CMU Serif" panose="02000603000000000000" pitchFamily="2" charset="0"/>
                           </a:rPr>
-                          <m:t>[</m:t>
+                          <m:t>  [</m:t>
                         </m:r>
                         <m:r>
                           <a:rPr lang="es-ES" sz="1100" i="1" dirty="0" smtClean="0">
@@ -5008,13 +5331,13 @@
                 </p:txBody>
               </p:sp>
             </mc:Choice>
-            <mc:Fallback>
+            <mc:Fallback xmlns="">
               <p:sp>
                 <p:nvSpPr>
-                  <p:cNvPr id="42" name="CuadroTexto 41">
+                  <p:cNvPr id="51" name="CuadroTexto 50">
                     <a:extLst>
                       <a:ext uri="{FF2B5EF4-FFF2-40B4-BE49-F238E27FC236}">
-                        <a16:creationId xmlns:a16="http://schemas.microsoft.com/office/drawing/2014/main" id="{677512E5-14DB-C4FA-99D5-3AFE9FEAAC4E}"/>
+                        <a16:creationId xmlns:a16="http://schemas.microsoft.com/office/drawing/2014/main" id="{68C6E714-B071-63B7-787A-CDAE2FCCF87F}"/>
                       </a:ext>
                     </a:extLst>
                   </p:cNvPr>
@@ -5025,14 +5348,14 @@
                 </p:nvSpPr>
                 <p:spPr>
                   <a:xfrm>
-                    <a:off x="1528782" y="1150720"/>
-                    <a:ext cx="593150" cy="261610"/>
+                    <a:off x="9045661" y="1159427"/>
+                    <a:ext cx="663765" cy="261610"/>
                   </a:xfrm>
                   <a:prstGeom prst="rect">
                     <a:avLst/>
                   </a:prstGeom>
                   <a:blipFill>
-                    <a:blip r:embed="rId8"/>
+                    <a:blip r:embed="rId10"/>
                     <a:stretch>
                       <a:fillRect b="-13333"/>
                     </a:stretch>
@@ -5060,10 +5383,10 @@
           </mc:AlternateContent>
           <p:sp>
             <p:nvSpPr>
-              <p:cNvPr id="43" name="CuadroTexto 42">
+              <p:cNvPr id="52" name="CuadroTexto 51">
                 <a:extLst>
                   <a:ext uri="{FF2B5EF4-FFF2-40B4-BE49-F238E27FC236}">
-                    <a16:creationId xmlns:a16="http://schemas.microsoft.com/office/drawing/2014/main" id="{3DD0C622-74AB-9EC4-C8E7-75F0278CD253}"/>
+                    <a16:creationId xmlns:a16="http://schemas.microsoft.com/office/drawing/2014/main" id="{0C9F07D8-E61B-DD9D-15FD-BBB34772E79D}"/>
                   </a:ext>
                 </a:extLst>
               </p:cNvPr>
@@ -5072,7 +5395,49 @@
             </p:nvSpPr>
             <p:spPr>
               <a:xfrm>
-                <a:off x="1622277" y="2396373"/>
+                <a:off x="9130141" y="1654550"/>
+                <a:ext cx="535517" cy="230832"/>
+              </a:xfrm>
+              <a:prstGeom prst="rect">
+                <a:avLst/>
+              </a:prstGeom>
+              <a:noFill/>
+            </p:spPr>
+            <p:txBody>
+              <a:bodyPr wrap="square" rtlCol="0">
+                <a:spAutoFit/>
+              </a:bodyPr>
+              <a:lstStyle/>
+              <a:p>
+                <a:r>
+                  <a:rPr lang="es-ES" sz="900" b="1" dirty="0">
+                    <a:solidFill>
+                      <a:srgbClr val="FF0000"/>
+                    </a:solidFill>
+                    <a:latin typeface="CMU Sans Serif" panose="02000603000000000000" pitchFamily="2" charset="0"/>
+                    <a:ea typeface="CMU Sans Serif" panose="02000603000000000000" pitchFamily="2" charset="0"/>
+                    <a:cs typeface="CMU Sans Serif" panose="02000603000000000000" pitchFamily="2" charset="0"/>
+                  </a:rPr>
+                  <a:t>0.25</a:t>
+                </a:r>
+              </a:p>
+            </p:txBody>
+          </p:sp>
+          <p:sp>
+            <p:nvSpPr>
+              <p:cNvPr id="53" name="CuadroTexto 52">
+                <a:extLst>
+                  <a:ext uri="{FF2B5EF4-FFF2-40B4-BE49-F238E27FC236}">
+                    <a16:creationId xmlns:a16="http://schemas.microsoft.com/office/drawing/2014/main" id="{25D57993-173C-FFCB-EB7D-B72B723D04EE}"/>
+                  </a:ext>
+                </a:extLst>
+              </p:cNvPr>
+              <p:cNvSpPr txBox="1"/>
+              <p:nvPr/>
+            </p:nvSpPr>
+            <p:spPr>
+              <a:xfrm>
+                <a:off x="8937284" y="1764996"/>
                 <a:ext cx="535517" cy="230832"/>
               </a:xfrm>
               <a:prstGeom prst="rect">
@@ -5102,10 +5467,10 @@
           </p:sp>
           <p:sp>
             <p:nvSpPr>
-              <p:cNvPr id="44" name="CuadroTexto 43">
+              <p:cNvPr id="54" name="CuadroTexto 53">
                 <a:extLst>
                   <a:ext uri="{FF2B5EF4-FFF2-40B4-BE49-F238E27FC236}">
-                    <a16:creationId xmlns:a16="http://schemas.microsoft.com/office/drawing/2014/main" id="{909CF04C-992D-896A-66A5-96793F1F6860}"/>
+                    <a16:creationId xmlns:a16="http://schemas.microsoft.com/office/drawing/2014/main" id="{CDB93B13-97A6-3916-6B13-9F9D79E22ABB}"/>
                   </a:ext>
                 </a:extLst>
               </p:cNvPr>
@@ -5114,91 +5479,7 @@
             </p:nvSpPr>
             <p:spPr>
               <a:xfrm>
-                <a:off x="1704887" y="2509895"/>
-                <a:ext cx="535517" cy="230832"/>
-              </a:xfrm>
-              <a:prstGeom prst="rect">
-                <a:avLst/>
-              </a:prstGeom>
-              <a:noFill/>
-            </p:spPr>
-            <p:txBody>
-              <a:bodyPr wrap="square" rtlCol="0">
-                <a:spAutoFit/>
-              </a:bodyPr>
-              <a:lstStyle/>
-              <a:p>
-                <a:r>
-                  <a:rPr lang="es-ES" sz="900" b="1" dirty="0">
-                    <a:solidFill>
-                      <a:srgbClr val="FF0000"/>
-                    </a:solidFill>
-                    <a:latin typeface="CMU Sans Serif" panose="02000603000000000000" pitchFamily="2" charset="0"/>
-                    <a:ea typeface="CMU Sans Serif" panose="02000603000000000000" pitchFamily="2" charset="0"/>
-                    <a:cs typeface="CMU Sans Serif" panose="02000603000000000000" pitchFamily="2" charset="0"/>
-                  </a:rPr>
-                  <a:t>0.25</a:t>
-                </a:r>
-              </a:p>
-            </p:txBody>
-          </p:sp>
-          <p:sp>
-            <p:nvSpPr>
-              <p:cNvPr id="45" name="CuadroTexto 44">
-                <a:extLst>
-                  <a:ext uri="{FF2B5EF4-FFF2-40B4-BE49-F238E27FC236}">
-                    <a16:creationId xmlns:a16="http://schemas.microsoft.com/office/drawing/2014/main" id="{3227B984-D2F3-127D-9366-2E094BDE2742}"/>
-                  </a:ext>
-                </a:extLst>
-              </p:cNvPr>
-              <p:cNvSpPr txBox="1"/>
-              <p:nvPr/>
-            </p:nvSpPr>
-            <p:spPr>
-              <a:xfrm>
-                <a:off x="1942199" y="2524343"/>
-                <a:ext cx="535517" cy="230832"/>
-              </a:xfrm>
-              <a:prstGeom prst="rect">
-                <a:avLst/>
-              </a:prstGeom>
-              <a:noFill/>
-            </p:spPr>
-            <p:txBody>
-              <a:bodyPr wrap="square" rtlCol="0">
-                <a:spAutoFit/>
-              </a:bodyPr>
-              <a:lstStyle/>
-              <a:p>
-                <a:r>
-                  <a:rPr lang="es-ES" sz="900" b="1" dirty="0">
-                    <a:solidFill>
-                      <a:srgbClr val="FF0000"/>
-                    </a:solidFill>
-                    <a:latin typeface="CMU Sans Serif" panose="02000603000000000000" pitchFamily="2" charset="0"/>
-                    <a:ea typeface="CMU Sans Serif" panose="02000603000000000000" pitchFamily="2" charset="0"/>
-                    <a:cs typeface="CMU Sans Serif" panose="02000603000000000000" pitchFamily="2" charset="0"/>
-                  </a:rPr>
-                  <a:t>0.5</a:t>
-                </a:r>
-              </a:p>
-            </p:txBody>
-          </p:sp>
-          <p:sp>
-            <p:nvSpPr>
-              <p:cNvPr id="46" name="CuadroTexto 45">
-                <a:extLst>
-                  <a:ext uri="{FF2B5EF4-FFF2-40B4-BE49-F238E27FC236}">
-                    <a16:creationId xmlns:a16="http://schemas.microsoft.com/office/drawing/2014/main" id="{6A1BE949-F8B2-2DB6-2C4A-08FB986C8A12}"/>
-                  </a:ext>
-                </a:extLst>
-              </p:cNvPr>
-              <p:cNvSpPr txBox="1"/>
-              <p:nvPr/>
-            </p:nvSpPr>
-            <p:spPr>
-              <a:xfrm>
-                <a:off x="2126319" y="2570587"/>
+                <a:off x="8538535" y="3700719"/>
                 <a:ext cx="535517" cy="230832"/>
               </a:xfrm>
               <a:prstGeom prst="rect">
@@ -5228,10 +5509,10 @@
           </p:sp>
           <p:sp>
             <p:nvSpPr>
-              <p:cNvPr id="47" name="CuadroTexto 46">
+              <p:cNvPr id="55" name="CuadroTexto 54">
                 <a:extLst>
                   <a:ext uri="{FF2B5EF4-FFF2-40B4-BE49-F238E27FC236}">
-                    <a16:creationId xmlns:a16="http://schemas.microsoft.com/office/drawing/2014/main" id="{FBC0964B-87A5-52DF-525D-310B49FD68E0}"/>
+                    <a16:creationId xmlns:a16="http://schemas.microsoft.com/office/drawing/2014/main" id="{2678BD0C-B458-B4DC-E16E-7B7F6DBC2DD2}"/>
                   </a:ext>
                 </a:extLst>
               </p:cNvPr>
@@ -5240,7 +5521,7 @@
             </p:nvSpPr>
             <p:spPr>
               <a:xfrm>
-                <a:off x="2307467" y="2440723"/>
+                <a:off x="9538654" y="2022692"/>
                 <a:ext cx="535517" cy="230832"/>
               </a:xfrm>
               <a:prstGeom prst="rect">
@@ -5268,468 +5549,50 @@
               </a:p>
             </p:txBody>
           </p:sp>
-        </p:grpSp>
-        <p:pic>
-          <p:nvPicPr>
-            <p:cNvPr id="50" name="Imagen 49" descr="Imagen que contiene Gráfico&#10;&#10;Descripción generada automáticamente">
-              <a:extLst>
-                <a:ext uri="{FF2B5EF4-FFF2-40B4-BE49-F238E27FC236}">
-                  <a16:creationId xmlns:a16="http://schemas.microsoft.com/office/drawing/2014/main" id="{BE57A326-C509-20FA-1A25-67CA1D1CC8AB}"/>
-                </a:ext>
-              </a:extLst>
-            </p:cNvPr>
-            <p:cNvPicPr>
-              <a:picLocks noChangeAspect="1"/>
-            </p:cNvPicPr>
-            <p:nvPr/>
-          </p:nvPicPr>
-          <p:blipFill>
-            <a:blip r:embed="rId9">
-              <a:extLst>
-                <a:ext uri="{28A0092B-C50C-407E-A947-70E740481C1C}">
-                  <a14:useLocalDpi xmlns:a14="http://schemas.microsoft.com/office/drawing/2010/main" val="0"/>
-                </a:ext>
-              </a:extLst>
-            </a:blip>
-            <a:stretch>
-              <a:fillRect/>
-            </a:stretch>
-          </p:blipFill>
-          <p:spPr>
-            <a:xfrm>
-              <a:off x="7638600" y="1102059"/>
-              <a:ext cx="2200772" cy="2829491"/>
-            </a:xfrm>
-            <a:prstGeom prst="rect">
-              <a:avLst/>
-            </a:prstGeom>
-            <a:ln>
-              <a:solidFill>
-                <a:schemeClr val="tx1"/>
-              </a:solidFill>
-            </a:ln>
-          </p:spPr>
-        </p:pic>
-        <mc:AlternateContent xmlns:mc="http://schemas.openxmlformats.org/markup-compatibility/2006">
-          <mc:Choice xmlns:a14="http://schemas.microsoft.com/office/drawing/2010/main" Requires="a14">
-            <p:sp>
-              <p:nvSpPr>
-                <p:cNvPr id="51" name="CuadroTexto 50">
-                  <a:extLst>
-                    <a:ext uri="{FF2B5EF4-FFF2-40B4-BE49-F238E27FC236}">
-                      <a16:creationId xmlns:a16="http://schemas.microsoft.com/office/drawing/2014/main" id="{68C6E714-B071-63B7-787A-CDAE2FCCF87F}"/>
-                    </a:ext>
-                  </a:extLst>
-                </p:cNvPr>
-                <p:cNvSpPr txBox="1"/>
-                <p:nvPr/>
-              </p:nvSpPr>
-              <p:spPr>
-                <a:xfrm>
-                  <a:off x="9045661" y="1159427"/>
-                  <a:ext cx="663765" cy="261610"/>
-                </a:xfrm>
-                <a:prstGeom prst="rect">
-                  <a:avLst/>
-                </a:prstGeom>
-                <a:solidFill>
-                  <a:schemeClr val="bg1"/>
-                </a:solidFill>
-                <a:ln w="9525">
-                  <a:solidFill>
-                    <a:schemeClr val="tx1"/>
-                  </a:solidFill>
-                </a:ln>
-              </p:spPr>
-              <p:txBody>
-                <a:bodyPr wrap="square" rtlCol="0">
-                  <a:spAutoFit/>
-                </a:bodyPr>
-                <a:lstStyle/>
-                <a:p>
-                  <a:r>
-                    <a:rPr lang="es-ES" sz="1100" i="1" dirty="0">
-                      <a:solidFill>
-                        <a:srgbClr val="FF0000"/>
-                      </a:solidFill>
-                      <a:latin typeface="CMU Serif" panose="02000603000000000000" pitchFamily="2" charset="0"/>
-                      <a:ea typeface="CMU Serif" panose="02000603000000000000" pitchFamily="2" charset="0"/>
-                      <a:cs typeface="CMU Serif" panose="02000603000000000000" pitchFamily="2" charset="0"/>
-                    </a:rPr>
-                    <a:t>M</a:t>
-                  </a:r>
-                  <a:r>
-                    <a:rPr lang="es-ES" sz="1100" baseline="-25000" dirty="0">
-                      <a:solidFill>
-                        <a:srgbClr val="FF0000"/>
-                      </a:solidFill>
-                      <a:latin typeface="CMU Serif" panose="02000603000000000000" pitchFamily="2" charset="0"/>
-                      <a:ea typeface="CMU Serif" panose="02000603000000000000" pitchFamily="2" charset="0"/>
-                      <a:cs typeface="CMU Serif" panose="02000603000000000000" pitchFamily="2" charset="0"/>
-                    </a:rPr>
-                    <a:t>0</a:t>
-                  </a:r>
-                  <a14:m>
-                    <m:oMath xmlns:m="http://schemas.openxmlformats.org/officeDocument/2006/math">
-                      <m:r>
-                        <a:rPr lang="es-ES" sz="1100" b="0" i="0" dirty="0" smtClean="0">
-                          <a:solidFill>
-                            <a:srgbClr val="FF0000"/>
-                          </a:solidFill>
-                          <a:latin typeface="Cambria Math" panose="02040503050406030204" pitchFamily="18" charset="0"/>
-                          <a:ea typeface="Adobe Ming Std L" panose="02020300000000000000" pitchFamily="18" charset="-128"/>
-                          <a:cs typeface="CMU Serif" panose="02000603000000000000" pitchFamily="2" charset="0"/>
-                        </a:rPr>
-                        <m:t>  [</m:t>
-                      </m:r>
-                      <m:r>
-                        <a:rPr lang="es-ES" sz="1100" i="1" dirty="0" smtClean="0">
-                          <a:solidFill>
-                            <a:srgbClr val="FF0000"/>
-                          </a:solidFill>
-                          <a:latin typeface="Cambria Math" panose="02040503050406030204" pitchFamily="18" charset="0"/>
-                          <a:ea typeface="Adobe Ming Std L" panose="02020300000000000000" pitchFamily="18" charset="-128"/>
-                          <a:cs typeface="CMU Serif" panose="02000603000000000000" pitchFamily="2" charset="0"/>
-                        </a:rPr>
-                        <m:t>−</m:t>
-                      </m:r>
-                      <m:r>
-                        <a:rPr lang="es-ES" sz="1100" b="0" i="0" dirty="0" smtClean="0">
-                          <a:solidFill>
-                            <a:srgbClr val="FF0000"/>
-                          </a:solidFill>
-                          <a:latin typeface="Cambria Math" panose="02040503050406030204" pitchFamily="18" charset="0"/>
-                          <a:ea typeface="Adobe Ming Std L" panose="02020300000000000000" pitchFamily="18" charset="-128"/>
-                          <a:cs typeface="CMU Serif" panose="02000603000000000000" pitchFamily="2" charset="0"/>
-                        </a:rPr>
-                        <m:t>]</m:t>
-                      </m:r>
-                    </m:oMath>
-                  </a14:m>
-                  <a:endParaRPr lang="es-ES" sz="1100" dirty="0">
-                    <a:solidFill>
-                      <a:srgbClr val="FF0000"/>
-                    </a:solidFill>
-                    <a:latin typeface="CMU Serif" panose="02000603000000000000" pitchFamily="2" charset="0"/>
-                    <a:ea typeface="CMU Serif" panose="02000603000000000000" pitchFamily="2" charset="0"/>
-                    <a:cs typeface="CMU Serif" panose="02000603000000000000" pitchFamily="2" charset="0"/>
-                  </a:endParaRPr>
-                </a:p>
-              </p:txBody>
-            </p:sp>
-          </mc:Choice>
-          <mc:Fallback>
-            <p:sp>
-              <p:nvSpPr>
-                <p:cNvPr id="51" name="CuadroTexto 50">
-                  <a:extLst>
-                    <a:ext uri="{FF2B5EF4-FFF2-40B4-BE49-F238E27FC236}">
-                      <a16:creationId xmlns:a16="http://schemas.microsoft.com/office/drawing/2014/main" id="{68C6E714-B071-63B7-787A-CDAE2FCCF87F}"/>
-                    </a:ext>
-                  </a:extLst>
-                </p:cNvPr>
-                <p:cNvSpPr txBox="1">
-                  <a:spLocks noRot="1" noChangeAspect="1" noMove="1" noResize="1" noEditPoints="1" noAdjustHandles="1" noChangeArrowheads="1" noChangeShapeType="1" noTextEdit="1"/>
-                </p:cNvSpPr>
-                <p:nvPr/>
-              </p:nvSpPr>
-              <p:spPr>
-                <a:xfrm>
-                  <a:off x="9045661" y="1159427"/>
-                  <a:ext cx="663765" cy="261610"/>
-                </a:xfrm>
-                <a:prstGeom prst="rect">
-                  <a:avLst/>
-                </a:prstGeom>
-                <a:blipFill>
-                  <a:blip r:embed="rId10"/>
-                  <a:stretch>
-                    <a:fillRect b="-13333"/>
-                  </a:stretch>
-                </a:blipFill>
-                <a:ln w="9525">
-                  <a:solidFill>
-                    <a:schemeClr val="tx1"/>
-                  </a:solidFill>
-                </a:ln>
-              </p:spPr>
-              <p:txBody>
-                <a:bodyPr/>
-                <a:lstStyle/>
-                <a:p>
-                  <a:r>
-                    <a:rPr lang="es-ES">
-                      <a:noFill/>
-                    </a:rPr>
-                    <a:t> </a:t>
-                  </a:r>
-                </a:p>
-              </p:txBody>
-            </p:sp>
-          </mc:Fallback>
-        </mc:AlternateContent>
-        <p:sp>
-          <p:nvSpPr>
-            <p:cNvPr id="52" name="CuadroTexto 51">
-              <a:extLst>
-                <a:ext uri="{FF2B5EF4-FFF2-40B4-BE49-F238E27FC236}">
-                  <a16:creationId xmlns:a16="http://schemas.microsoft.com/office/drawing/2014/main" id="{0C9F07D8-E61B-DD9D-15FD-BBB34772E79D}"/>
-                </a:ext>
-              </a:extLst>
-            </p:cNvPr>
-            <p:cNvSpPr txBox="1"/>
-            <p:nvPr/>
-          </p:nvSpPr>
-          <p:spPr>
-            <a:xfrm>
-              <a:off x="9130141" y="1654550"/>
-              <a:ext cx="535517" cy="230832"/>
-            </a:xfrm>
-            <a:prstGeom prst="rect">
-              <a:avLst/>
-            </a:prstGeom>
-            <a:noFill/>
-          </p:spPr>
-          <p:txBody>
-            <a:bodyPr wrap="square" rtlCol="0">
-              <a:spAutoFit/>
-            </a:bodyPr>
-            <a:lstStyle/>
-            <a:p>
-              <a:r>
-                <a:rPr lang="es-ES" sz="900" b="1" dirty="0">
-                  <a:solidFill>
-                    <a:srgbClr val="FF0000"/>
-                  </a:solidFill>
-                  <a:latin typeface="CMU Sans Serif" panose="02000603000000000000" pitchFamily="2" charset="0"/>
-                  <a:ea typeface="CMU Sans Serif" panose="02000603000000000000" pitchFamily="2" charset="0"/>
-                  <a:cs typeface="CMU Sans Serif" panose="02000603000000000000" pitchFamily="2" charset="0"/>
-                </a:rPr>
-                <a:t>0.25</a:t>
-              </a:r>
-            </a:p>
-          </p:txBody>
-        </p:sp>
-        <p:sp>
-          <p:nvSpPr>
-            <p:cNvPr id="53" name="CuadroTexto 52">
-              <a:extLst>
-                <a:ext uri="{FF2B5EF4-FFF2-40B4-BE49-F238E27FC236}">
-                  <a16:creationId xmlns:a16="http://schemas.microsoft.com/office/drawing/2014/main" id="{25D57993-173C-FFCB-EB7D-B72B723D04EE}"/>
-                </a:ext>
-              </a:extLst>
-            </p:cNvPr>
-            <p:cNvSpPr txBox="1"/>
-            <p:nvPr/>
-          </p:nvSpPr>
-          <p:spPr>
-            <a:xfrm>
-              <a:off x="8937284" y="1764996"/>
-              <a:ext cx="535517" cy="230832"/>
-            </a:xfrm>
-            <a:prstGeom prst="rect">
-              <a:avLst/>
-            </a:prstGeom>
-            <a:noFill/>
-          </p:spPr>
-          <p:txBody>
-            <a:bodyPr wrap="square" rtlCol="0">
-              <a:spAutoFit/>
-            </a:bodyPr>
-            <a:lstStyle/>
-            <a:p>
-              <a:r>
-                <a:rPr lang="es-ES" sz="900" b="1" dirty="0">
-                  <a:solidFill>
-                    <a:srgbClr val="FF0000"/>
-                  </a:solidFill>
-                  <a:latin typeface="CMU Sans Serif" panose="02000603000000000000" pitchFamily="2" charset="0"/>
-                  <a:ea typeface="CMU Sans Serif" panose="02000603000000000000" pitchFamily="2" charset="0"/>
-                  <a:cs typeface="CMU Sans Serif" panose="02000603000000000000" pitchFamily="2" charset="0"/>
-                </a:rPr>
-                <a:t>0.0</a:t>
-              </a:r>
-            </a:p>
-          </p:txBody>
-        </p:sp>
-        <p:sp>
-          <p:nvSpPr>
-            <p:cNvPr id="54" name="CuadroTexto 53">
-              <a:extLst>
-                <a:ext uri="{FF2B5EF4-FFF2-40B4-BE49-F238E27FC236}">
-                  <a16:creationId xmlns:a16="http://schemas.microsoft.com/office/drawing/2014/main" id="{CDB93B13-97A6-3916-6B13-9F9D79E22ABB}"/>
-                </a:ext>
-              </a:extLst>
-            </p:cNvPr>
-            <p:cNvSpPr txBox="1"/>
-            <p:nvPr/>
-          </p:nvSpPr>
-          <p:spPr>
-            <a:xfrm>
-              <a:off x="8538535" y="3700719"/>
-              <a:ext cx="535517" cy="230832"/>
-            </a:xfrm>
-            <a:prstGeom prst="rect">
-              <a:avLst/>
-            </a:prstGeom>
-            <a:noFill/>
-          </p:spPr>
-          <p:txBody>
-            <a:bodyPr wrap="square" rtlCol="0">
-              <a:spAutoFit/>
-            </a:bodyPr>
-            <a:lstStyle/>
-            <a:p>
-              <a:r>
-                <a:rPr lang="es-ES" sz="900" b="1" dirty="0">
-                  <a:solidFill>
-                    <a:srgbClr val="FF0000"/>
-                  </a:solidFill>
-                  <a:latin typeface="CMU Sans Serif" panose="02000603000000000000" pitchFamily="2" charset="0"/>
-                  <a:ea typeface="CMU Sans Serif" panose="02000603000000000000" pitchFamily="2" charset="0"/>
-                  <a:cs typeface="CMU Sans Serif" panose="02000603000000000000" pitchFamily="2" charset="0"/>
-                </a:rPr>
-                <a:t>0.75</a:t>
-              </a:r>
-            </a:p>
-          </p:txBody>
-        </p:sp>
-        <p:sp>
-          <p:nvSpPr>
-            <p:cNvPr id="55" name="CuadroTexto 54">
-              <a:extLst>
-                <a:ext uri="{FF2B5EF4-FFF2-40B4-BE49-F238E27FC236}">
-                  <a16:creationId xmlns:a16="http://schemas.microsoft.com/office/drawing/2014/main" id="{2678BD0C-B458-B4DC-E16E-7B7F6DBC2DD2}"/>
-                </a:ext>
-              </a:extLst>
-            </p:cNvPr>
-            <p:cNvSpPr txBox="1"/>
-            <p:nvPr/>
-          </p:nvSpPr>
-          <p:spPr>
-            <a:xfrm>
-              <a:off x="9538654" y="2022692"/>
-              <a:ext cx="535517" cy="230832"/>
-            </a:xfrm>
-            <a:prstGeom prst="rect">
-              <a:avLst/>
-            </a:prstGeom>
-            <a:noFill/>
-          </p:spPr>
-          <p:txBody>
-            <a:bodyPr wrap="square" rtlCol="0">
-              <a:spAutoFit/>
-            </a:bodyPr>
-            <a:lstStyle/>
-            <a:p>
-              <a:r>
-                <a:rPr lang="es-ES" sz="900" b="1" dirty="0">
-                  <a:solidFill>
-                    <a:srgbClr val="FF0000"/>
-                  </a:solidFill>
-                  <a:latin typeface="CMU Sans Serif" panose="02000603000000000000" pitchFamily="2" charset="0"/>
-                  <a:ea typeface="CMU Sans Serif" panose="02000603000000000000" pitchFamily="2" charset="0"/>
-                  <a:cs typeface="CMU Sans Serif" panose="02000603000000000000" pitchFamily="2" charset="0"/>
-                </a:rPr>
-                <a:t>1.0</a:t>
-              </a:r>
-            </a:p>
-          </p:txBody>
-        </p:sp>
-        <p:sp>
-          <p:nvSpPr>
-            <p:cNvPr id="56" name="CuadroTexto 55">
-              <a:extLst>
-                <a:ext uri="{FF2B5EF4-FFF2-40B4-BE49-F238E27FC236}">
-                  <a16:creationId xmlns:a16="http://schemas.microsoft.com/office/drawing/2014/main" id="{8997C693-28A2-3226-CFBB-3A9ACCC86449}"/>
-                </a:ext>
-              </a:extLst>
-            </p:cNvPr>
-            <p:cNvSpPr txBox="1"/>
-            <p:nvPr/>
-          </p:nvSpPr>
-          <p:spPr>
-            <a:xfrm>
-              <a:off x="9332338" y="1751697"/>
-              <a:ext cx="535517" cy="230832"/>
-            </a:xfrm>
-            <a:prstGeom prst="rect">
-              <a:avLst/>
-            </a:prstGeom>
-            <a:noFill/>
-          </p:spPr>
-          <p:txBody>
-            <a:bodyPr wrap="square" rtlCol="0">
-              <a:spAutoFit/>
-            </a:bodyPr>
-            <a:lstStyle/>
-            <a:p>
-              <a:r>
-                <a:rPr lang="es-ES" sz="900" b="1" dirty="0">
-                  <a:solidFill>
-                    <a:srgbClr val="FF0000"/>
-                  </a:solidFill>
-                  <a:latin typeface="CMU Sans Serif" panose="02000603000000000000" pitchFamily="2" charset="0"/>
-                  <a:ea typeface="CMU Sans Serif" panose="02000603000000000000" pitchFamily="2" charset="0"/>
-                  <a:cs typeface="CMU Sans Serif" panose="02000603000000000000" pitchFamily="2" charset="0"/>
-                </a:rPr>
-                <a:t>0.5</a:t>
-              </a:r>
-            </a:p>
-          </p:txBody>
-        </p:sp>
-      </p:grpSp>
-      <mc:AlternateContent xmlns:mc="http://schemas.openxmlformats.org/markup-compatibility/2006">
-        <mc:Choice xmlns:p14="http://schemas.microsoft.com/office/powerpoint/2010/main" Requires="p14">
-          <p:contentPart p14:bwMode="auto" r:id="rId11">
-            <p14:nvContentPartPr>
-              <p14:cNvPr id="63" name="Entrada de lápiz 62">
+          <p:sp>
+            <p:nvSpPr>
+              <p:cNvPr id="56" name="CuadroTexto 55">
                 <a:extLst>
                   <a:ext uri="{FF2B5EF4-FFF2-40B4-BE49-F238E27FC236}">
-                    <a16:creationId xmlns:a16="http://schemas.microsoft.com/office/drawing/2014/main" id="{BAB8A263-EF04-A5F5-D31C-F4EA21ED68BF}"/>
-                  </a:ext>
-                </a:extLst>
-              </p14:cNvPr>
-              <p14:cNvContentPartPr/>
-              <p14:nvPr/>
-            </p14:nvContentPartPr>
-            <p14:xfrm>
-              <a:off x="9610468" y="2046653"/>
-              <a:ext cx="21240" cy="26280"/>
-            </p14:xfrm>
-          </p:contentPart>
-        </mc:Choice>
-        <mc:Fallback>
-          <p:pic>
-            <p:nvPicPr>
-              <p:cNvPr id="63" name="Entrada de lápiz 62">
-                <a:extLst>
-                  <a:ext uri="{FF2B5EF4-FFF2-40B4-BE49-F238E27FC236}">
-                    <a16:creationId xmlns:a16="http://schemas.microsoft.com/office/drawing/2014/main" id="{BAB8A263-EF04-A5F5-D31C-F4EA21ED68BF}"/>
+                    <a16:creationId xmlns:a16="http://schemas.microsoft.com/office/drawing/2014/main" id="{8997C693-28A2-3226-CFBB-3A9ACCC86449}"/>
                   </a:ext>
                 </a:extLst>
               </p:cNvPr>
-              <p:cNvPicPr/>
+              <p:cNvSpPr txBox="1"/>
               <p:nvPr/>
-            </p:nvPicPr>
-            <p:blipFill>
-              <a:blip r:embed="rId12"/>
-              <a:stretch>
-                <a:fillRect/>
-              </a:stretch>
-            </p:blipFill>
+            </p:nvSpPr>
             <p:spPr>
               <a:xfrm>
-                <a:off x="9606148" y="2042333"/>
-                <a:ext cx="29880" cy="34920"/>
+                <a:off x="9332338" y="1751697"/>
+                <a:ext cx="535517" cy="230832"/>
               </a:xfrm>
               <a:prstGeom prst="rect">
                 <a:avLst/>
               </a:prstGeom>
+              <a:noFill/>
             </p:spPr>
-          </p:pic>
-        </mc:Fallback>
-      </mc:AlternateContent>
+            <p:txBody>
+              <a:bodyPr wrap="square" rtlCol="0">
+                <a:spAutoFit/>
+              </a:bodyPr>
+              <a:lstStyle/>
+              <a:p>
+                <a:r>
+                  <a:rPr lang="es-ES" sz="900" b="1" dirty="0">
+                    <a:solidFill>
+                      <a:srgbClr val="FF0000"/>
+                    </a:solidFill>
+                    <a:latin typeface="CMU Sans Serif" panose="02000603000000000000" pitchFamily="2" charset="0"/>
+                    <a:ea typeface="CMU Sans Serif" panose="02000603000000000000" pitchFamily="2" charset="0"/>
+                    <a:cs typeface="CMU Sans Serif" panose="02000603000000000000" pitchFamily="2" charset="0"/>
+                  </a:rPr>
+                  <a:t>0.5</a:t>
+                </a:r>
+              </a:p>
+            </p:txBody>
+          </p:sp>
+        </p:grpSp>
+      </p:grpSp>
     </p:spTree>
     <p:extLst>
       <p:ext uri="{BB962C8B-B14F-4D97-AF65-F5344CB8AC3E}">

</xml_diff>